<commit_message>
centralised all GPU QuEST.cpp code
</commit_message>
<xml_diff>
--- a/QuEST/funcdefs/QuEST structure.pptx
+++ b/QuEST/funcdefs/QuEST structure.pptx
@@ -4,6 +4,9 @@
   <p:sldMasterIdLst>
     <p:sldMasterId id="2147483780" r:id="rId1"/>
   </p:sldMasterIdLst>
+  <p:notesMasterIdLst>
+    <p:notesMasterId r:id="rId3"/>
+  </p:notesMasterIdLst>
   <p:sldIdLst>
     <p:sldId id="256" r:id="rId2"/>
   </p:sldIdLst>
@@ -110,6 +113,439 @@
     </p:ext>
   </p:extLst>
 </p:presentation>
+</file>
+
+<file path=ppt/notesMasters/notesMaster1.xml><?xml version="1.0" encoding="utf-8"?>
+<p:notesMaster xmlns:a="http://schemas.openxmlformats.org/drawingml/2006/main" xmlns:r="http://schemas.openxmlformats.org/officeDocument/2006/relationships" xmlns:p="http://schemas.openxmlformats.org/presentationml/2006/main">
+  <p:cSld>
+    <p:bg>
+      <p:bgRef idx="1001">
+        <a:schemeClr val="bg1"/>
+      </p:bgRef>
+    </p:bg>
+    <p:spTree>
+      <p:nvGrpSpPr>
+        <p:cNvPr id="1" name=""/>
+        <p:cNvGrpSpPr/>
+        <p:nvPr/>
+      </p:nvGrpSpPr>
+      <p:grpSpPr>
+        <a:xfrm>
+          <a:off x="0" y="0"/>
+          <a:ext cx="0" cy="0"/>
+          <a:chOff x="0" y="0"/>
+          <a:chExt cx="0" cy="0"/>
+        </a:xfrm>
+      </p:grpSpPr>
+      <p:sp>
+        <p:nvSpPr>
+          <p:cNvPr id="2" name="Header Placeholder 1"/>
+          <p:cNvSpPr>
+            <a:spLocks noGrp="1"/>
+          </p:cNvSpPr>
+          <p:nvPr>
+            <p:ph type="hdr" sz="quarter"/>
+          </p:nvPr>
+        </p:nvSpPr>
+        <p:spPr>
+          <a:xfrm>
+            <a:off x="0" y="0"/>
+            <a:ext cx="2971800" cy="458788"/>
+          </a:xfrm>
+          <a:prstGeom prst="rect">
+            <a:avLst/>
+          </a:prstGeom>
+        </p:spPr>
+        <p:txBody>
+          <a:bodyPr vert="horz" lIns="91440" tIns="45720" rIns="91440" bIns="45720" rtlCol="0"/>
+          <a:lstStyle>
+            <a:lvl1pPr algn="l">
+              <a:defRPr sz="1200"/>
+            </a:lvl1pPr>
+          </a:lstStyle>
+          <a:p>
+            <a:endParaRPr lang="en-US"/>
+          </a:p>
+        </p:txBody>
+      </p:sp>
+      <p:sp>
+        <p:nvSpPr>
+          <p:cNvPr id="3" name="Date Placeholder 2"/>
+          <p:cNvSpPr>
+            <a:spLocks noGrp="1"/>
+          </p:cNvSpPr>
+          <p:nvPr>
+            <p:ph type="dt" idx="1"/>
+          </p:nvPr>
+        </p:nvSpPr>
+        <p:spPr>
+          <a:xfrm>
+            <a:off x="3884613" y="0"/>
+            <a:ext cx="2971800" cy="458788"/>
+          </a:xfrm>
+          <a:prstGeom prst="rect">
+            <a:avLst/>
+          </a:prstGeom>
+        </p:spPr>
+        <p:txBody>
+          <a:bodyPr vert="horz" lIns="91440" tIns="45720" rIns="91440" bIns="45720" rtlCol="0"/>
+          <a:lstStyle>
+            <a:lvl1pPr algn="r">
+              <a:defRPr sz="1200"/>
+            </a:lvl1pPr>
+          </a:lstStyle>
+          <a:p>
+            <a:fld id="{9C2944CE-78EF-F74B-9784-7D46EC8EF4C6}" type="datetimeFigureOut">
+              <a:rPr lang="en-US" smtClean="0"/>
+              <a:t>7/18/18</a:t>
+            </a:fld>
+            <a:endParaRPr lang="en-US"/>
+          </a:p>
+        </p:txBody>
+      </p:sp>
+      <p:sp>
+        <p:nvSpPr>
+          <p:cNvPr id="4" name="Slide Image Placeholder 3"/>
+          <p:cNvSpPr>
+            <a:spLocks noGrp="1" noRot="1" noChangeAspect="1"/>
+          </p:cNvSpPr>
+          <p:nvPr>
+            <p:ph type="sldImg" idx="2"/>
+          </p:nvPr>
+        </p:nvSpPr>
+        <p:spPr>
+          <a:xfrm>
+            <a:off x="857250" y="1143000"/>
+            <a:ext cx="5143500" cy="3086100"/>
+          </a:xfrm>
+          <a:prstGeom prst="rect">
+            <a:avLst/>
+          </a:prstGeom>
+          <a:noFill/>
+          <a:ln w="12700">
+            <a:solidFill>
+              <a:prstClr val="black"/>
+            </a:solidFill>
+          </a:ln>
+        </p:spPr>
+        <p:txBody>
+          <a:bodyPr vert="horz" lIns="91440" tIns="45720" rIns="91440" bIns="45720" rtlCol="0" anchor="ctr"/>
+          <a:lstStyle/>
+          <a:p>
+            <a:endParaRPr lang="en-US"/>
+          </a:p>
+        </p:txBody>
+      </p:sp>
+      <p:sp>
+        <p:nvSpPr>
+          <p:cNvPr id="5" name="Notes Placeholder 4"/>
+          <p:cNvSpPr>
+            <a:spLocks noGrp="1"/>
+          </p:cNvSpPr>
+          <p:nvPr>
+            <p:ph type="body" sz="quarter" idx="3"/>
+          </p:nvPr>
+        </p:nvSpPr>
+        <p:spPr>
+          <a:xfrm>
+            <a:off x="685800" y="4400550"/>
+            <a:ext cx="5486400" cy="3600450"/>
+          </a:xfrm>
+          <a:prstGeom prst="rect">
+            <a:avLst/>
+          </a:prstGeom>
+        </p:spPr>
+        <p:txBody>
+          <a:bodyPr vert="horz" lIns="91440" tIns="45720" rIns="91440" bIns="45720" rtlCol="0"/>
+          <a:lstStyle/>
+          <a:p>
+            <a:pPr lvl="0"/>
+            <a:r>
+              <a:rPr lang="en-US"/>
+              <a:t>Edit Master text styles</a:t>
+            </a:r>
+          </a:p>
+          <a:p>
+            <a:pPr lvl="1"/>
+            <a:r>
+              <a:rPr lang="en-US"/>
+              <a:t>Second level</a:t>
+            </a:r>
+          </a:p>
+          <a:p>
+            <a:pPr lvl="2"/>
+            <a:r>
+              <a:rPr lang="en-US"/>
+              <a:t>Third level</a:t>
+            </a:r>
+          </a:p>
+          <a:p>
+            <a:pPr lvl="3"/>
+            <a:r>
+              <a:rPr lang="en-US"/>
+              <a:t>Fourth level</a:t>
+            </a:r>
+          </a:p>
+          <a:p>
+            <a:pPr lvl="4"/>
+            <a:r>
+              <a:rPr lang="en-US"/>
+              <a:t>Fifth level</a:t>
+            </a:r>
+          </a:p>
+        </p:txBody>
+      </p:sp>
+      <p:sp>
+        <p:nvSpPr>
+          <p:cNvPr id="6" name="Footer Placeholder 5"/>
+          <p:cNvSpPr>
+            <a:spLocks noGrp="1"/>
+          </p:cNvSpPr>
+          <p:nvPr>
+            <p:ph type="ftr" sz="quarter" idx="4"/>
+          </p:nvPr>
+        </p:nvSpPr>
+        <p:spPr>
+          <a:xfrm>
+            <a:off x="0" y="8685213"/>
+            <a:ext cx="2971800" cy="458787"/>
+          </a:xfrm>
+          <a:prstGeom prst="rect">
+            <a:avLst/>
+          </a:prstGeom>
+        </p:spPr>
+        <p:txBody>
+          <a:bodyPr vert="horz" lIns="91440" tIns="45720" rIns="91440" bIns="45720" rtlCol="0" anchor="b"/>
+          <a:lstStyle>
+            <a:lvl1pPr algn="l">
+              <a:defRPr sz="1200"/>
+            </a:lvl1pPr>
+          </a:lstStyle>
+          <a:p>
+            <a:endParaRPr lang="en-US"/>
+          </a:p>
+        </p:txBody>
+      </p:sp>
+      <p:sp>
+        <p:nvSpPr>
+          <p:cNvPr id="7" name="Slide Number Placeholder 6"/>
+          <p:cNvSpPr>
+            <a:spLocks noGrp="1"/>
+          </p:cNvSpPr>
+          <p:nvPr>
+            <p:ph type="sldNum" sz="quarter" idx="5"/>
+          </p:nvPr>
+        </p:nvSpPr>
+        <p:spPr>
+          <a:xfrm>
+            <a:off x="3884613" y="8685213"/>
+            <a:ext cx="2971800" cy="458787"/>
+          </a:xfrm>
+          <a:prstGeom prst="rect">
+            <a:avLst/>
+          </a:prstGeom>
+        </p:spPr>
+        <p:txBody>
+          <a:bodyPr vert="horz" lIns="91440" tIns="45720" rIns="91440" bIns="45720" rtlCol="0" anchor="b"/>
+          <a:lstStyle>
+            <a:lvl1pPr algn="r">
+              <a:defRPr sz="1200"/>
+            </a:lvl1pPr>
+          </a:lstStyle>
+          <a:p>
+            <a:fld id="{D1A087AA-0DB7-1441-AD52-A116D66CDCB7}" type="slidenum">
+              <a:rPr lang="en-US" smtClean="0"/>
+              <a:t>‹#›</a:t>
+            </a:fld>
+            <a:endParaRPr lang="en-US"/>
+          </a:p>
+        </p:txBody>
+      </p:sp>
+    </p:spTree>
+    <p:extLst>
+      <p:ext uri="{BB962C8B-B14F-4D97-AF65-F5344CB8AC3E}">
+        <p14:creationId xmlns:p14="http://schemas.microsoft.com/office/powerpoint/2010/main" val="4190639382"/>
+      </p:ext>
+    </p:extLst>
+  </p:cSld>
+  <p:clrMap bg1="lt1" tx1="dk1" bg2="lt2" tx2="dk2" accent1="accent1" accent2="accent2" accent3="accent3" accent4="accent4" accent5="accent5" accent6="accent6" hlink="hlink" folHlink="folHlink"/>
+  <p:notesStyle>
+    <a:lvl1pPr marL="0" algn="l" defTabSz="914400" rtl="0" eaLnBrk="1" latinLnBrk="0" hangingPunct="1">
+      <a:defRPr sz="1200" kern="1200">
+        <a:solidFill>
+          <a:schemeClr val="tx1"/>
+        </a:solidFill>
+        <a:latin typeface="+mn-lt"/>
+        <a:ea typeface="+mn-ea"/>
+        <a:cs typeface="+mn-cs"/>
+      </a:defRPr>
+    </a:lvl1pPr>
+    <a:lvl2pPr marL="457200" algn="l" defTabSz="914400" rtl="0" eaLnBrk="1" latinLnBrk="0" hangingPunct="1">
+      <a:defRPr sz="1200" kern="1200">
+        <a:solidFill>
+          <a:schemeClr val="tx1"/>
+        </a:solidFill>
+        <a:latin typeface="+mn-lt"/>
+        <a:ea typeface="+mn-ea"/>
+        <a:cs typeface="+mn-cs"/>
+      </a:defRPr>
+    </a:lvl2pPr>
+    <a:lvl3pPr marL="914400" algn="l" defTabSz="914400" rtl="0" eaLnBrk="1" latinLnBrk="0" hangingPunct="1">
+      <a:defRPr sz="1200" kern="1200">
+        <a:solidFill>
+          <a:schemeClr val="tx1"/>
+        </a:solidFill>
+        <a:latin typeface="+mn-lt"/>
+        <a:ea typeface="+mn-ea"/>
+        <a:cs typeface="+mn-cs"/>
+      </a:defRPr>
+    </a:lvl3pPr>
+    <a:lvl4pPr marL="1371600" algn="l" defTabSz="914400" rtl="0" eaLnBrk="1" latinLnBrk="0" hangingPunct="1">
+      <a:defRPr sz="1200" kern="1200">
+        <a:solidFill>
+          <a:schemeClr val="tx1"/>
+        </a:solidFill>
+        <a:latin typeface="+mn-lt"/>
+        <a:ea typeface="+mn-ea"/>
+        <a:cs typeface="+mn-cs"/>
+      </a:defRPr>
+    </a:lvl4pPr>
+    <a:lvl5pPr marL="1828800" algn="l" defTabSz="914400" rtl="0" eaLnBrk="1" latinLnBrk="0" hangingPunct="1">
+      <a:defRPr sz="1200" kern="1200">
+        <a:solidFill>
+          <a:schemeClr val="tx1"/>
+        </a:solidFill>
+        <a:latin typeface="+mn-lt"/>
+        <a:ea typeface="+mn-ea"/>
+        <a:cs typeface="+mn-cs"/>
+      </a:defRPr>
+    </a:lvl5pPr>
+    <a:lvl6pPr marL="2286000" algn="l" defTabSz="914400" rtl="0" eaLnBrk="1" latinLnBrk="0" hangingPunct="1">
+      <a:defRPr sz="1200" kern="1200">
+        <a:solidFill>
+          <a:schemeClr val="tx1"/>
+        </a:solidFill>
+        <a:latin typeface="+mn-lt"/>
+        <a:ea typeface="+mn-ea"/>
+        <a:cs typeface="+mn-cs"/>
+      </a:defRPr>
+    </a:lvl6pPr>
+    <a:lvl7pPr marL="2743200" algn="l" defTabSz="914400" rtl="0" eaLnBrk="1" latinLnBrk="0" hangingPunct="1">
+      <a:defRPr sz="1200" kern="1200">
+        <a:solidFill>
+          <a:schemeClr val="tx1"/>
+        </a:solidFill>
+        <a:latin typeface="+mn-lt"/>
+        <a:ea typeface="+mn-ea"/>
+        <a:cs typeface="+mn-cs"/>
+      </a:defRPr>
+    </a:lvl7pPr>
+    <a:lvl8pPr marL="3200400" algn="l" defTabSz="914400" rtl="0" eaLnBrk="1" latinLnBrk="0" hangingPunct="1">
+      <a:defRPr sz="1200" kern="1200">
+        <a:solidFill>
+          <a:schemeClr val="tx1"/>
+        </a:solidFill>
+        <a:latin typeface="+mn-lt"/>
+        <a:ea typeface="+mn-ea"/>
+        <a:cs typeface="+mn-cs"/>
+      </a:defRPr>
+    </a:lvl8pPr>
+    <a:lvl9pPr marL="3657600" algn="l" defTabSz="914400" rtl="0" eaLnBrk="1" latinLnBrk="0" hangingPunct="1">
+      <a:defRPr sz="1200" kern="1200">
+        <a:solidFill>
+          <a:schemeClr val="tx1"/>
+        </a:solidFill>
+        <a:latin typeface="+mn-lt"/>
+        <a:ea typeface="+mn-ea"/>
+        <a:cs typeface="+mn-cs"/>
+      </a:defRPr>
+    </a:lvl9pPr>
+  </p:notesStyle>
+</p:notesMaster>
+</file>
+
+<file path=ppt/notesSlides/notesSlide1.xml><?xml version="1.0" encoding="utf-8"?>
+<p:notes xmlns:a="http://schemas.openxmlformats.org/drawingml/2006/main" xmlns:r="http://schemas.openxmlformats.org/officeDocument/2006/relationships" xmlns:p="http://schemas.openxmlformats.org/presentationml/2006/main">
+  <p:cSld>
+    <p:spTree>
+      <p:nvGrpSpPr>
+        <p:cNvPr id="1" name=""/>
+        <p:cNvGrpSpPr/>
+        <p:nvPr/>
+      </p:nvGrpSpPr>
+      <p:grpSpPr>
+        <a:xfrm>
+          <a:off x="0" y="0"/>
+          <a:ext cx="0" cy="0"/>
+          <a:chOff x="0" y="0"/>
+          <a:chExt cx="0" cy="0"/>
+        </a:xfrm>
+      </p:grpSpPr>
+      <p:sp>
+        <p:nvSpPr>
+          <p:cNvPr id="2" name="Slide Image Placeholder 1"/>
+          <p:cNvSpPr>
+            <a:spLocks noGrp="1" noRot="1" noChangeAspect="1"/>
+          </p:cNvSpPr>
+          <p:nvPr>
+            <p:ph type="sldImg"/>
+          </p:nvPr>
+        </p:nvSpPr>
+        <p:spPr/>
+      </p:sp>
+      <p:sp>
+        <p:nvSpPr>
+          <p:cNvPr id="3" name="Notes Placeholder 2"/>
+          <p:cNvSpPr>
+            <a:spLocks noGrp="1"/>
+          </p:cNvSpPr>
+          <p:nvPr>
+            <p:ph type="body" idx="1"/>
+          </p:nvPr>
+        </p:nvSpPr>
+        <p:spPr/>
+        <p:txBody>
+          <a:bodyPr/>
+          <a:lstStyle/>
+          <a:p>
+            <a:endParaRPr lang="en-US"/>
+          </a:p>
+        </p:txBody>
+      </p:sp>
+      <p:sp>
+        <p:nvSpPr>
+          <p:cNvPr id="4" name="Slide Number Placeholder 3"/>
+          <p:cNvSpPr>
+            <a:spLocks noGrp="1"/>
+          </p:cNvSpPr>
+          <p:nvPr>
+            <p:ph type="sldNum" sz="quarter" idx="10"/>
+          </p:nvPr>
+        </p:nvSpPr>
+        <p:spPr/>
+        <p:txBody>
+          <a:bodyPr/>
+          <a:lstStyle/>
+          <a:p>
+            <a:fld id="{D1A087AA-0DB7-1441-AD52-A116D66CDCB7}" type="slidenum">
+              <a:rPr lang="en-US" smtClean="0"/>
+              <a:t>1</a:t>
+            </a:fld>
+            <a:endParaRPr lang="en-US"/>
+          </a:p>
+        </p:txBody>
+      </p:sp>
+    </p:spTree>
+    <p:extLst>
+      <p:ext uri="{BB962C8B-B14F-4D97-AF65-F5344CB8AC3E}">
+        <p14:creationId xmlns:p14="http://schemas.microsoft.com/office/powerpoint/2010/main" val="2055041391"/>
+      </p:ext>
+    </p:extLst>
+  </p:cSld>
+  <p:clrMapOvr>
+    <a:masterClrMapping/>
+  </p:clrMapOvr>
+</p:notes>
 </file>
 
 <file path=ppt/slideLayouts/slideLayout1.xml><?xml version="1.0" encoding="utf-8"?>
@@ -4052,7 +4488,7 @@
             <a:r>
               <a:rPr lang="en-GB" sz="1000">
                 <a:solidFill>
-                  <a:schemeClr val="accent2"/>
+                  <a:schemeClr val="accent6"/>
                 </a:solidFill>
               </a:rPr>
               <a:t>validateAlphaBeta</a:t>
@@ -4062,7 +4498,7 @@
             <a:r>
               <a:rPr lang="en-GB" sz="1000">
                 <a:solidFill>
-                  <a:schemeClr val="accent2"/>
+                  <a:schemeClr val="accent6"/>
                 </a:solidFill>
               </a:rPr>
               <a:t>validateMatrixIsUnitary</a:t>
@@ -4100,7 +4536,7 @@
         <p:spPr>
           <a:xfrm>
             <a:off x="195914" y="388588"/>
-            <a:ext cx="1802757" cy="1800493"/>
+            <a:ext cx="1802757" cy="1954381"/>
           </a:xfrm>
           <a:prstGeom prst="rect">
             <a:avLst/>
@@ -4136,10 +4572,30 @@
             <a:r>
               <a:rPr lang="en-GB" sz="1000">
                 <a:solidFill>
+                  <a:srgbClr val="FF0000"/>
+                </a:solidFill>
+              </a:rPr>
+              <a:t>QuESTAssert</a:t>
+            </a:r>
+          </a:p>
+          <a:p>
+            <a:r>
+              <a:rPr lang="en-GB" sz="1000">
+                <a:solidFill>
+                  <a:srgbClr val="FF0000"/>
+                </a:solidFill>
+              </a:rPr>
+              <a:t>exitWithError</a:t>
+            </a:r>
+          </a:p>
+          <a:p>
+            <a:r>
+              <a:rPr lang="en-GB" sz="1000">
+                <a:solidFill>
                   <a:schemeClr val="accent2"/>
                 </a:solidFill>
               </a:rPr>
-              <a:t>QuESTAssert</a:t>
+              <a:t>findProbabilityOfZero</a:t>
             </a:r>
           </a:p>
           <a:p>
@@ -4149,8 +4605,25 @@
                   <a:schemeClr val="accent2"/>
                 </a:solidFill>
               </a:rPr>
-              <a:t>exitWithError</a:t>
-            </a:r>
+              <a:t>measureInZero</a:t>
+            </a:r>
+          </a:p>
+          <a:p>
+            <a:r>
+              <a:rPr lang="en-GB" sz="1000">
+                <a:solidFill>
+                  <a:srgbClr val="00B050"/>
+                </a:solidFill>
+              </a:rPr>
+              <a:t>phaseGate</a:t>
+            </a:r>
+          </a:p>
+          <a:p>
+            <a:endParaRPr lang="en-GB" sz="1000">
+              <a:solidFill>
+                <a:schemeClr val="accent2"/>
+              </a:solidFill>
+            </a:endParaRPr>
           </a:p>
           <a:p>
             <a:r>
@@ -4159,16 +4632,6 @@
                   <a:schemeClr val="accent2"/>
                 </a:solidFill>
               </a:rPr>
-              <a:t>findProbabilityOfZero</a:t>
-            </a:r>
-          </a:p>
-          <a:p>
-            <a:r>
-              <a:rPr lang="en-GB" sz="1000">
-                <a:solidFill>
-                  <a:schemeClr val="accent2"/>
-                </a:solidFill>
-              </a:rPr>
               <a:t>hashString</a:t>
             </a:r>
           </a:p>
@@ -4176,27 +4639,7 @@
             <a:r>
               <a:rPr lang="en-GB" sz="1000">
                 <a:solidFill>
-                  <a:schemeClr val="accent2"/>
-                </a:solidFill>
-              </a:rPr>
-              <a:t>measureInZero</a:t>
-            </a:r>
-          </a:p>
-          <a:p>
-            <a:r>
-              <a:rPr lang="en-GB" sz="1000">
-                <a:solidFill>
-                  <a:schemeClr val="accent2"/>
-                </a:solidFill>
-              </a:rPr>
-              <a:t>phaseGate</a:t>
-            </a:r>
-          </a:p>
-          <a:p>
-            <a:r>
-              <a:rPr lang="en-GB" sz="1000">
-                <a:solidFill>
-                  <a:schemeClr val="accent2"/>
+                  <a:schemeClr val="accent6"/>
                 </a:solidFill>
               </a:rPr>
               <a:t>validateAlphaBeta</a:t>
@@ -4206,7 +4649,7 @@
             <a:r>
               <a:rPr lang="en-GB" sz="1000">
                 <a:solidFill>
-                  <a:schemeClr val="accent2"/>
+                  <a:schemeClr val="accent6"/>
                 </a:solidFill>
               </a:rPr>
               <a:t>validateMatrixIsUnitary</a:t>
@@ -4593,10 +5036,30 @@
             <a:r>
               <a:rPr lang="en-GB" sz="1000">
                 <a:solidFill>
+                  <a:srgbClr val="FF0000"/>
+                </a:solidFill>
+              </a:rPr>
+              <a:t>QuESTAssert</a:t>
+            </a:r>
+          </a:p>
+          <a:p>
+            <a:r>
+              <a:rPr lang="en-GB" sz="1000">
+                <a:solidFill>
+                  <a:srgbClr val="FF0000"/>
+                </a:solidFill>
+              </a:rPr>
+              <a:t>exitWithError</a:t>
+            </a:r>
+          </a:p>
+          <a:p>
+            <a:r>
+              <a:rPr lang="en-GB" sz="1000">
+                <a:solidFill>
                   <a:schemeClr val="accent2"/>
                 </a:solidFill>
               </a:rPr>
-              <a:t>QuESTAssert</a:t>
+              <a:t>findProbabilityOfZero</a:t>
             </a:r>
           </a:p>
           <a:p>
@@ -4606,26 +5069,6 @@
                   <a:schemeClr val="accent2"/>
                 </a:solidFill>
               </a:rPr>
-              <a:t>exitWithError</a:t>
-            </a:r>
-          </a:p>
-          <a:p>
-            <a:r>
-              <a:rPr lang="en-GB" sz="1000">
-                <a:solidFill>
-                  <a:schemeClr val="accent2"/>
-                </a:solidFill>
-              </a:rPr>
-              <a:t>findProbabilityOfZero</a:t>
-            </a:r>
-          </a:p>
-          <a:p>
-            <a:r>
-              <a:rPr lang="en-GB" sz="1000">
-                <a:solidFill>
-                  <a:schemeClr val="accent2"/>
-                </a:solidFill>
-              </a:rPr>
               <a:t>measureInZero</a:t>
             </a:r>
           </a:p>
@@ -4633,7 +5076,7 @@
             <a:r>
               <a:rPr lang="en-GB" sz="1000">
                 <a:solidFill>
-                  <a:schemeClr val="accent2"/>
+                  <a:schemeClr val="accent6"/>
                 </a:solidFill>
               </a:rPr>
               <a:t>phaseGate</a:t>
@@ -4945,7 +5388,7 @@
             <a:r>
               <a:rPr lang="en-GB" sz="1000">
                 <a:solidFill>
-                  <a:schemeClr val="accent1"/>
+                  <a:srgbClr val="FF0000"/>
                 </a:solidFill>
               </a:rPr>
               <a:t>controlledPhaseGate</a:t>
@@ -5616,7 +6059,7 @@
         <p:spPr>
           <a:xfrm>
             <a:off x="17299822" y="396618"/>
-            <a:ext cx="2310063" cy="5493812"/>
+            <a:ext cx="2310063" cy="5647700"/>
           </a:xfrm>
           <a:prstGeom prst="rect">
             <a:avLst/>
@@ -5655,7 +6098,7 @@
                   <a:schemeClr val="accent2"/>
                 </a:solidFill>
               </a:rPr>
-              <a:t>QuESTAssert</a:t>
+              <a:t>collapseToOutcomeDistributedRenorm</a:t>
             </a:r>
           </a:p>
           <a:p>
@@ -5665,7 +6108,7 @@
                   <a:schemeClr val="accent2"/>
                 </a:solidFill>
               </a:rPr>
-              <a:t>collapseToOutcomeDistributedRenorm</a:t>
+              <a:t>collapseToOutcomeDistributedSetZero</a:t>
             </a:r>
           </a:p>
           <a:p>
@@ -5675,7 +6118,7 @@
                   <a:schemeClr val="accent2"/>
                 </a:solidFill>
               </a:rPr>
-              <a:t>collapseToOutcomeDistributedSetZero</a:t>
+              <a:t>collapseToOutcomeLocal</a:t>
             </a:r>
           </a:p>
           <a:p>
@@ -5685,7 +6128,7 @@
                   <a:schemeClr val="accent2"/>
                 </a:solidFill>
               </a:rPr>
-              <a:t>collapseToOutcomeLocal</a:t>
+              <a:t>compactUnitaryDistributed</a:t>
             </a:r>
           </a:p>
           <a:p>
@@ -5695,7 +6138,7 @@
                   <a:schemeClr val="accent2"/>
                 </a:solidFill>
               </a:rPr>
-              <a:t>compactUnitaryDistributed</a:t>
+              <a:t>compactUnitaryLocal</a:t>
             </a:r>
           </a:p>
           <a:p>
@@ -5705,7 +6148,7 @@
                   <a:schemeClr val="accent2"/>
                 </a:solidFill>
               </a:rPr>
-              <a:t>compactUnitaryLocal</a:t>
+              <a:t>controlledCompactUnitaryDistributed</a:t>
             </a:r>
           </a:p>
           <a:p>
@@ -5715,7 +6158,7 @@
                   <a:schemeClr val="accent2"/>
                 </a:solidFill>
               </a:rPr>
-              <a:t>controlledCompactUnitaryDistributed</a:t>
+              <a:t>controlledCompactUnitaryLocal</a:t>
             </a:r>
           </a:p>
           <a:p>
@@ -5725,7 +6168,7 @@
                   <a:schemeClr val="accent2"/>
                 </a:solidFill>
               </a:rPr>
-              <a:t>controlledCompactUnitaryLocal</a:t>
+              <a:t>controlledNotDistributed</a:t>
             </a:r>
           </a:p>
           <a:p>
@@ -5735,7 +6178,7 @@
                   <a:schemeClr val="accent2"/>
                 </a:solidFill>
               </a:rPr>
-              <a:t>controlledNotDistributed</a:t>
+              <a:t>controlledNotLocal</a:t>
             </a:r>
           </a:p>
           <a:p>
@@ -5745,7 +6188,7 @@
                   <a:schemeClr val="accent2"/>
                 </a:solidFill>
               </a:rPr>
-              <a:t>controlledNotLocal</a:t>
+              <a:t>controlledUnitaryDistributed</a:t>
             </a:r>
           </a:p>
           <a:p>
@@ -5755,7 +6198,7 @@
                   <a:schemeClr val="accent2"/>
                 </a:solidFill>
               </a:rPr>
-              <a:t>controlledUnitaryDistributed</a:t>
+              <a:t>controlledUnitaryLocal</a:t>
             </a:r>
           </a:p>
           <a:p>
@@ -5765,7 +6208,7 @@
                   <a:schemeClr val="accent2"/>
                 </a:solidFill>
               </a:rPr>
-              <a:t>controlledUnitaryLocal</a:t>
+              <a:t>findProbabilityOfZeroDistributed</a:t>
             </a:r>
           </a:p>
           <a:p>
@@ -5775,7 +6218,7 @@
                   <a:schemeClr val="accent2"/>
                 </a:solidFill>
               </a:rPr>
-              <a:t>exitWithError</a:t>
+              <a:t>findProbabilityOfZeroLocal</a:t>
             </a:r>
           </a:p>
           <a:p>
@@ -5785,7 +6228,7 @@
                   <a:schemeClr val="accent2"/>
                 </a:solidFill>
               </a:rPr>
-              <a:t>findProbabilityOfZeroDistributed</a:t>
+              <a:t>hadamardDistributed</a:t>
             </a:r>
           </a:p>
           <a:p>
@@ -5795,7 +6238,7 @@
                   <a:schemeClr val="accent2"/>
                 </a:solidFill>
               </a:rPr>
-              <a:t>findProbabilityOfZeroLocal</a:t>
+              <a:t>hadamardLocal</a:t>
             </a:r>
           </a:p>
           <a:p>
@@ -5805,7 +6248,7 @@
                   <a:schemeClr val="accent2"/>
                 </a:solidFill>
               </a:rPr>
-              <a:t>hadamardDistributed</a:t>
+              <a:t>hashString</a:t>
             </a:r>
           </a:p>
           <a:p>
@@ -5815,7 +6258,7 @@
                   <a:schemeClr val="accent2"/>
                 </a:solidFill>
               </a:rPr>
-              <a:t>hadamardLocal</a:t>
+              <a:t>multiControlledUnitaryDistributed</a:t>
             </a:r>
           </a:p>
           <a:p>
@@ -5825,7 +6268,7 @@
                   <a:schemeClr val="accent2"/>
                 </a:solidFill>
               </a:rPr>
-              <a:t>hashString</a:t>
+              <a:t>multiControlledUnitaryLocal</a:t>
             </a:r>
           </a:p>
           <a:p>
@@ -5835,7 +6278,7 @@
                   <a:schemeClr val="accent2"/>
                 </a:solidFill>
               </a:rPr>
-              <a:t>multiControlledUnitaryDistributed</a:t>
+              <a:t>phaseGateDistributed</a:t>
             </a:r>
           </a:p>
           <a:p>
@@ -5845,7 +6288,7 @@
                   <a:schemeClr val="accent2"/>
                 </a:solidFill>
               </a:rPr>
-              <a:t>multiControlledUnitaryLocal</a:t>
+              <a:t>phaseGateLocal</a:t>
             </a:r>
           </a:p>
           <a:p>
@@ -5855,7 +6298,7 @@
                   <a:schemeClr val="accent2"/>
                 </a:solidFill>
               </a:rPr>
-              <a:t>phaseGate</a:t>
+              <a:t>sigmaXDistributed</a:t>
             </a:r>
           </a:p>
           <a:p>
@@ -5865,7 +6308,7 @@
                   <a:schemeClr val="accent2"/>
                 </a:solidFill>
               </a:rPr>
-              <a:t>phaseGateDistributed</a:t>
+              <a:t>sigmaXLocal</a:t>
             </a:r>
           </a:p>
           <a:p>
@@ -5875,7 +6318,7 @@
                   <a:schemeClr val="accent2"/>
                 </a:solidFill>
               </a:rPr>
-              <a:t>phaseGateLocal</a:t>
+              <a:t>sigmaYDistributed</a:t>
             </a:r>
           </a:p>
           <a:p>
@@ -5885,7 +6328,7 @@
                   <a:schemeClr val="accent2"/>
                 </a:solidFill>
               </a:rPr>
-              <a:t>sigmaXDistributed</a:t>
+              <a:t>sigmaYLocal</a:t>
             </a:r>
           </a:p>
           <a:p>
@@ -5895,7 +6338,7 @@
                   <a:schemeClr val="accent2"/>
                 </a:solidFill>
               </a:rPr>
-              <a:t>sigmaXLocal</a:t>
+              <a:t>unitaryDistributed</a:t>
             </a:r>
           </a:p>
           <a:p>
@@ -5905,7 +6348,7 @@
                   <a:schemeClr val="accent2"/>
                 </a:solidFill>
               </a:rPr>
-              <a:t>sigmaYDistributed</a:t>
+              <a:t>unitaryLocal</a:t>
             </a:r>
           </a:p>
           <a:p>
@@ -5915,7 +6358,7 @@
                   <a:schemeClr val="accent2"/>
                 </a:solidFill>
               </a:rPr>
-              <a:t>sigmaYLocal</a:t>
+              <a:t>validateAlphaBeta</a:t>
             </a:r>
           </a:p>
           <a:p>
@@ -5925,7 +6368,7 @@
                   <a:schemeClr val="accent2"/>
                 </a:solidFill>
               </a:rPr>
-              <a:t>unitaryDistributed</a:t>
+              <a:t>validateMatrixIsUnitary</a:t>
             </a:r>
           </a:p>
           <a:p>
@@ -5935,43 +6378,45 @@
                   <a:schemeClr val="accent2"/>
                 </a:solidFill>
               </a:rPr>
-              <a:t>unitaryLocal</a:t>
-            </a:r>
-          </a:p>
-          <a:p>
-            <a:r>
-              <a:rPr lang="en-GB" sz="1000">
-                <a:solidFill>
-                  <a:schemeClr val="accent2"/>
-                </a:solidFill>
-              </a:rPr>
-              <a:t>validateAlphaBeta</a:t>
-            </a:r>
-          </a:p>
-          <a:p>
-            <a:r>
-              <a:rPr lang="en-GB" sz="1000">
-                <a:solidFill>
-                  <a:schemeClr val="accent2"/>
-                </a:solidFill>
-              </a:rPr>
-              <a:t>validateMatrixIsUnitary</a:t>
-            </a:r>
-          </a:p>
-          <a:p>
-            <a:r>
-              <a:rPr lang="en-GB" sz="1000">
-                <a:solidFill>
-                  <a:schemeClr val="accent2"/>
-                </a:solidFill>
-              </a:rPr>
               <a:t>validateUnitVector</a:t>
             </a:r>
-            <a:endParaRPr lang="en-US" sz="1000" dirty="0">
+          </a:p>
+          <a:p>
+            <a:endParaRPr lang="en-GB" sz="1000">
               <a:solidFill>
                 <a:schemeClr val="accent2"/>
               </a:solidFill>
             </a:endParaRPr>
+          </a:p>
+          <a:p>
+            <a:r>
+              <a:rPr lang="en-GB" sz="1000">
+                <a:solidFill>
+                  <a:schemeClr val="accent2"/>
+                </a:solidFill>
+              </a:rPr>
+              <a:t>QuESTAssert</a:t>
+            </a:r>
+          </a:p>
+          <a:p>
+            <a:r>
+              <a:rPr lang="en-GB" sz="1000">
+                <a:solidFill>
+                  <a:schemeClr val="accent2"/>
+                </a:solidFill>
+              </a:rPr>
+              <a:t>exitWithError</a:t>
+            </a:r>
+          </a:p>
+          <a:p>
+            <a:r>
+              <a:rPr lang="en-GB" sz="1000">
+                <a:solidFill>
+                  <a:schemeClr val="accent2"/>
+                </a:solidFill>
+              </a:rPr>
+              <a:t>phaseGate</a:t>
+            </a:r>
           </a:p>
         </p:txBody>
       </p:sp>
@@ -6999,6 +7444,107 @@
             <a:r>
               <a:rPr lang="en-US" b="1"/>
               <a:t>API</a:t>
+            </a:r>
+          </a:p>
+        </p:txBody>
+      </p:sp>
+      <p:sp>
+        <p:nvSpPr>
+          <p:cNvPr id="2" name="TextBox 1">
+            <a:extLst>
+              <a:ext uri="{FF2B5EF4-FFF2-40B4-BE49-F238E27FC236}">
+                <a16:creationId xmlns:a16="http://schemas.microsoft.com/office/drawing/2014/main" id="{20364925-34C5-CB4C-BE83-F76B1FA2E733}"/>
+              </a:ext>
+            </a:extLst>
+          </p:cNvPr>
+          <p:cNvSpPr txBox="1"/>
+          <p:nvPr/>
+        </p:nvSpPr>
+        <p:spPr>
+          <a:xfrm>
+            <a:off x="285085" y="5597712"/>
+            <a:ext cx="1888915" cy="461665"/>
+          </a:xfrm>
+          <a:prstGeom prst="rect">
+            <a:avLst/>
+          </a:prstGeom>
+          <a:noFill/>
+        </p:spPr>
+        <p:txBody>
+          <a:bodyPr wrap="none" rtlCol="0">
+            <a:spAutoFit/>
+          </a:bodyPr>
+          <a:lstStyle/>
+          <a:p>
+            <a:r>
+              <a:rPr lang="en-US" sz="1200">
+                <a:solidFill>
+                  <a:srgbClr val="FF0000"/>
+                </a:solidFill>
+              </a:rPr>
+              <a:t>* Aren’t GPU specific </a:t>
+            </a:r>
+            <a:r>
+              <a:rPr lang="en-US" sz="1200" b="1">
+                <a:solidFill>
+                  <a:srgbClr val="FF0000"/>
+                </a:solidFill>
+              </a:rPr>
+              <a:t>AND</a:t>
+            </a:r>
+            <a:endParaRPr lang="en-US" sz="1200">
+              <a:solidFill>
+                <a:srgbClr val="FF0000"/>
+              </a:solidFill>
+            </a:endParaRPr>
+          </a:p>
+          <a:p>
+            <a:r>
+              <a:rPr lang="en-US" sz="1200">
+                <a:solidFill>
+                  <a:schemeClr val="accent2"/>
+                </a:solidFill>
+              </a:rPr>
+              <a:t>* Aren’t used by QuEST.cpp</a:t>
+            </a:r>
+          </a:p>
+        </p:txBody>
+      </p:sp>
+      <p:sp>
+        <p:nvSpPr>
+          <p:cNvPr id="17" name="TextBox 16">
+            <a:extLst>
+              <a:ext uri="{FF2B5EF4-FFF2-40B4-BE49-F238E27FC236}">
+                <a16:creationId xmlns:a16="http://schemas.microsoft.com/office/drawing/2014/main" id="{188615E7-EE4D-7849-96DB-C19D8C48C2A6}"/>
+              </a:ext>
+            </a:extLst>
+          </p:cNvPr>
+          <p:cNvSpPr txBox="1"/>
+          <p:nvPr/>
+        </p:nvSpPr>
+        <p:spPr>
+          <a:xfrm>
+            <a:off x="4177369" y="4625742"/>
+            <a:ext cx="2766463" cy="276999"/>
+          </a:xfrm>
+          <a:prstGeom prst="rect">
+            <a:avLst/>
+          </a:prstGeom>
+          <a:noFill/>
+        </p:spPr>
+        <p:txBody>
+          <a:bodyPr wrap="none" rtlCol="0">
+            <a:spAutoFit/>
+          </a:bodyPr>
+          <a:lstStyle/>
+          <a:p>
+            <a:r>
+              <a:rPr lang="en-US" sz="1200">
+                <a:solidFill>
+                  <a:schemeClr val="accent2"/>
+                </a:solidFill>
+              </a:rPr>
+              <a:t>* Aren’t used by QuEST_env_localGPU.cu</a:t>
             </a:r>
           </a:p>
         </p:txBody>
@@ -7275,4 +7821,299 @@
     </a:ext>
   </a:extLst>
 </a:theme>
+</file>
+
+<file path=ppt/theme/theme2.xml><?xml version="1.0" encoding="utf-8"?>
+<a:theme xmlns:a="http://schemas.openxmlformats.org/drawingml/2006/main" name="Office Theme">
+  <a:themeElements>
+    <a:clrScheme name="Office">
+      <a:dk1>
+        <a:sysClr val="windowText" lastClr="000000"/>
+      </a:dk1>
+      <a:lt1>
+        <a:sysClr val="window" lastClr="FFFFFF"/>
+      </a:lt1>
+      <a:dk2>
+        <a:srgbClr val="44546A"/>
+      </a:dk2>
+      <a:lt2>
+        <a:srgbClr val="E7E6E6"/>
+      </a:lt2>
+      <a:accent1>
+        <a:srgbClr val="4472C4"/>
+      </a:accent1>
+      <a:accent2>
+        <a:srgbClr val="ED7D31"/>
+      </a:accent2>
+      <a:accent3>
+        <a:srgbClr val="A5A5A5"/>
+      </a:accent3>
+      <a:accent4>
+        <a:srgbClr val="FFC000"/>
+      </a:accent4>
+      <a:accent5>
+        <a:srgbClr val="5B9BD5"/>
+      </a:accent5>
+      <a:accent6>
+        <a:srgbClr val="70AD47"/>
+      </a:accent6>
+      <a:hlink>
+        <a:srgbClr val="0563C1"/>
+      </a:hlink>
+      <a:folHlink>
+        <a:srgbClr val="954F72"/>
+      </a:folHlink>
+    </a:clrScheme>
+    <a:fontScheme name="Office">
+      <a:majorFont>
+        <a:latin typeface="Calibri Light" panose="020F0302020204030204"/>
+        <a:ea typeface=""/>
+        <a:cs typeface=""/>
+        <a:font script="Jpan" typeface="游ゴシック Light"/>
+        <a:font script="Hang" typeface="맑은 고딕"/>
+        <a:font script="Hans" typeface="等线 Light"/>
+        <a:font script="Hant" typeface="新細明體"/>
+        <a:font script="Arab" typeface="Times New Roman"/>
+        <a:font script="Hebr" typeface="Times New Roman"/>
+        <a:font script="Thai" typeface="Angsana New"/>
+        <a:font script="Ethi" typeface="Nyala"/>
+        <a:font script="Beng" typeface="Vrinda"/>
+        <a:font script="Gujr" typeface="Shruti"/>
+        <a:font script="Khmr" typeface="MoolBoran"/>
+        <a:font script="Knda" typeface="Tunga"/>
+        <a:font script="Guru" typeface="Raavi"/>
+        <a:font script="Cans" typeface="Euphemia"/>
+        <a:font script="Cher" typeface="Plantagenet Cherokee"/>
+        <a:font script="Yiii" typeface="Microsoft Yi Baiti"/>
+        <a:font script="Tibt" typeface="Microsoft Himalaya"/>
+        <a:font script="Thaa" typeface="MV Boli"/>
+        <a:font script="Deva" typeface="Mangal"/>
+        <a:font script="Telu" typeface="Gautami"/>
+        <a:font script="Taml" typeface="Latha"/>
+        <a:font script="Syrc" typeface="Estrangelo Edessa"/>
+        <a:font script="Orya" typeface="Kalinga"/>
+        <a:font script="Mlym" typeface="Kartika"/>
+        <a:font script="Laoo" typeface="DokChampa"/>
+        <a:font script="Sinh" typeface="Iskoola Pota"/>
+        <a:font script="Mong" typeface="Mongolian Baiti"/>
+        <a:font script="Viet" typeface="Times New Roman"/>
+        <a:font script="Uigh" typeface="Microsoft Uighur"/>
+        <a:font script="Geor" typeface="Sylfaen"/>
+        <a:font script="Armn" typeface="Arial"/>
+        <a:font script="Bugi" typeface="Leelawadee UI"/>
+        <a:font script="Bopo" typeface="Microsoft JhengHei"/>
+        <a:font script="Java" typeface="Javanese Text"/>
+        <a:font script="Lisu" typeface="Segoe UI"/>
+        <a:font script="Mymr" typeface="Myanmar Text"/>
+        <a:font script="Nkoo" typeface="Ebrima"/>
+        <a:font script="Olck" typeface="Nirmala UI"/>
+        <a:font script="Osma" typeface="Ebrima"/>
+        <a:font script="Phag" typeface="Phagspa"/>
+        <a:font script="Syrn" typeface="Estrangelo Edessa"/>
+        <a:font script="Syrj" typeface="Estrangelo Edessa"/>
+        <a:font script="Syre" typeface="Estrangelo Edessa"/>
+        <a:font script="Sora" typeface="Nirmala UI"/>
+        <a:font script="Tale" typeface="Microsoft Tai Le"/>
+        <a:font script="Talu" typeface="Microsoft New Tai Lue"/>
+        <a:font script="Tfng" typeface="Ebrima"/>
+      </a:majorFont>
+      <a:minorFont>
+        <a:latin typeface="Calibri" panose="020F0502020204030204"/>
+        <a:ea typeface=""/>
+        <a:cs typeface=""/>
+        <a:font script="Jpan" typeface="游ゴシック"/>
+        <a:font script="Hang" typeface="맑은 고딕"/>
+        <a:font script="Hans" typeface="等线"/>
+        <a:font script="Hant" typeface="新細明體"/>
+        <a:font script="Arab" typeface="Arial"/>
+        <a:font script="Hebr" typeface="Arial"/>
+        <a:font script="Thai" typeface="Cordia New"/>
+        <a:font script="Ethi" typeface="Nyala"/>
+        <a:font script="Beng" typeface="Vrinda"/>
+        <a:font script="Gujr" typeface="Shruti"/>
+        <a:font script="Khmr" typeface="DaunPenh"/>
+        <a:font script="Knda" typeface="Tunga"/>
+        <a:font script="Guru" typeface="Raavi"/>
+        <a:font script="Cans" typeface="Euphemia"/>
+        <a:font script="Cher" typeface="Plantagenet Cherokee"/>
+        <a:font script="Yiii" typeface="Microsoft Yi Baiti"/>
+        <a:font script="Tibt" typeface="Microsoft Himalaya"/>
+        <a:font script="Thaa" typeface="MV Boli"/>
+        <a:font script="Deva" typeface="Mangal"/>
+        <a:font script="Telu" typeface="Gautami"/>
+        <a:font script="Taml" typeface="Latha"/>
+        <a:font script="Syrc" typeface="Estrangelo Edessa"/>
+        <a:font script="Orya" typeface="Kalinga"/>
+        <a:font script="Mlym" typeface="Kartika"/>
+        <a:font script="Laoo" typeface="DokChampa"/>
+        <a:font script="Sinh" typeface="Iskoola Pota"/>
+        <a:font script="Mong" typeface="Mongolian Baiti"/>
+        <a:font script="Viet" typeface="Arial"/>
+        <a:font script="Uigh" typeface="Microsoft Uighur"/>
+        <a:font script="Geor" typeface="Sylfaen"/>
+        <a:font script="Armn" typeface="Arial"/>
+        <a:font script="Bugi" typeface="Leelawadee UI"/>
+        <a:font script="Bopo" typeface="Microsoft JhengHei"/>
+        <a:font script="Java" typeface="Javanese Text"/>
+        <a:font script="Lisu" typeface="Segoe UI"/>
+        <a:font script="Mymr" typeface="Myanmar Text"/>
+        <a:font script="Nkoo" typeface="Ebrima"/>
+        <a:font script="Olck" typeface="Nirmala UI"/>
+        <a:font script="Osma" typeface="Ebrima"/>
+        <a:font script="Phag" typeface="Phagspa"/>
+        <a:font script="Syrn" typeface="Estrangelo Edessa"/>
+        <a:font script="Syrj" typeface="Estrangelo Edessa"/>
+        <a:font script="Syre" typeface="Estrangelo Edessa"/>
+        <a:font script="Sora" typeface="Nirmala UI"/>
+        <a:font script="Tale" typeface="Microsoft Tai Le"/>
+        <a:font script="Talu" typeface="Microsoft New Tai Lue"/>
+        <a:font script="Tfng" typeface="Ebrima"/>
+      </a:minorFont>
+    </a:fontScheme>
+    <a:fmtScheme name="Office">
+      <a:fillStyleLst>
+        <a:solidFill>
+          <a:schemeClr val="phClr"/>
+        </a:solidFill>
+        <a:gradFill rotWithShape="1">
+          <a:gsLst>
+            <a:gs pos="0">
+              <a:schemeClr val="phClr">
+                <a:lumMod val="110000"/>
+                <a:satMod val="105000"/>
+                <a:tint val="67000"/>
+              </a:schemeClr>
+            </a:gs>
+            <a:gs pos="50000">
+              <a:schemeClr val="phClr">
+                <a:lumMod val="105000"/>
+                <a:satMod val="103000"/>
+                <a:tint val="73000"/>
+              </a:schemeClr>
+            </a:gs>
+            <a:gs pos="100000">
+              <a:schemeClr val="phClr">
+                <a:lumMod val="105000"/>
+                <a:satMod val="109000"/>
+                <a:tint val="81000"/>
+              </a:schemeClr>
+            </a:gs>
+          </a:gsLst>
+          <a:lin ang="5400000" scaled="0"/>
+        </a:gradFill>
+        <a:gradFill rotWithShape="1">
+          <a:gsLst>
+            <a:gs pos="0">
+              <a:schemeClr val="phClr">
+                <a:satMod val="103000"/>
+                <a:lumMod val="102000"/>
+                <a:tint val="94000"/>
+              </a:schemeClr>
+            </a:gs>
+            <a:gs pos="50000">
+              <a:schemeClr val="phClr">
+                <a:satMod val="110000"/>
+                <a:lumMod val="100000"/>
+                <a:shade val="100000"/>
+              </a:schemeClr>
+            </a:gs>
+            <a:gs pos="100000">
+              <a:schemeClr val="phClr">
+                <a:lumMod val="99000"/>
+                <a:satMod val="120000"/>
+                <a:shade val="78000"/>
+              </a:schemeClr>
+            </a:gs>
+          </a:gsLst>
+          <a:lin ang="5400000" scaled="0"/>
+        </a:gradFill>
+      </a:fillStyleLst>
+      <a:lnStyleLst>
+        <a:ln w="6350" cap="flat" cmpd="sng" algn="ctr">
+          <a:solidFill>
+            <a:schemeClr val="phClr"/>
+          </a:solidFill>
+          <a:prstDash val="solid"/>
+          <a:miter lim="800000"/>
+        </a:ln>
+        <a:ln w="12700" cap="flat" cmpd="sng" algn="ctr">
+          <a:solidFill>
+            <a:schemeClr val="phClr"/>
+          </a:solidFill>
+          <a:prstDash val="solid"/>
+          <a:miter lim="800000"/>
+        </a:ln>
+        <a:ln w="19050" cap="flat" cmpd="sng" algn="ctr">
+          <a:solidFill>
+            <a:schemeClr val="phClr"/>
+          </a:solidFill>
+          <a:prstDash val="solid"/>
+          <a:miter lim="800000"/>
+        </a:ln>
+      </a:lnStyleLst>
+      <a:effectStyleLst>
+        <a:effectStyle>
+          <a:effectLst/>
+        </a:effectStyle>
+        <a:effectStyle>
+          <a:effectLst/>
+        </a:effectStyle>
+        <a:effectStyle>
+          <a:effectLst>
+            <a:outerShdw blurRad="57150" dist="19050" dir="5400000" algn="ctr" rotWithShape="0">
+              <a:srgbClr val="000000">
+                <a:alpha val="63000"/>
+              </a:srgbClr>
+            </a:outerShdw>
+          </a:effectLst>
+        </a:effectStyle>
+      </a:effectStyleLst>
+      <a:bgFillStyleLst>
+        <a:solidFill>
+          <a:schemeClr val="phClr"/>
+        </a:solidFill>
+        <a:solidFill>
+          <a:schemeClr val="phClr">
+            <a:tint val="95000"/>
+            <a:satMod val="170000"/>
+          </a:schemeClr>
+        </a:solidFill>
+        <a:gradFill rotWithShape="1">
+          <a:gsLst>
+            <a:gs pos="0">
+              <a:schemeClr val="phClr">
+                <a:tint val="93000"/>
+                <a:satMod val="150000"/>
+                <a:shade val="98000"/>
+                <a:lumMod val="102000"/>
+              </a:schemeClr>
+            </a:gs>
+            <a:gs pos="50000">
+              <a:schemeClr val="phClr">
+                <a:tint val="98000"/>
+                <a:satMod val="130000"/>
+                <a:shade val="90000"/>
+                <a:lumMod val="103000"/>
+              </a:schemeClr>
+            </a:gs>
+            <a:gs pos="100000">
+              <a:schemeClr val="phClr">
+                <a:shade val="63000"/>
+                <a:satMod val="120000"/>
+              </a:schemeClr>
+            </a:gs>
+          </a:gsLst>
+          <a:lin ang="5400000" scaled="0"/>
+        </a:gradFill>
+      </a:bgFillStyleLst>
+    </a:fmtScheme>
+  </a:themeElements>
+  <a:objectDefaults/>
+  <a:extraClrSchemeLst/>
+  <a:extLst>
+    <a:ext uri="{05A4C25C-085E-4340-85A3-A5531E510DB2}">
+      <thm15:themeFamily xmlns:thm15="http://schemas.microsoft.com/office/thememl/2012/main" name="Office Theme" id="{62F939B6-93AF-4DB8-9C6B-D6C7DFDC589F}" vid="{4A3C46E8-61CC-4603-A589-7422A47A8E4A}"/>
+    </a:ext>
+  </a:extLst>
+</a:theme>
 </file>
</xml_diff>

<commit_message>
renamed backend code to be pure_oldsymbol
stabilised compilation on GPU and CPU
</commit_message>
<xml_diff>
--- a/QuEST/funcdefs/QuEST structure.pptx
+++ b/QuEST/funcdefs/QuEST structure.pptx
@@ -5,10 +5,11 @@
     <p:sldMasterId id="2147483780" r:id="rId1"/>
   </p:sldMasterIdLst>
   <p:notesMasterIdLst>
-    <p:notesMasterId r:id="rId3"/>
+    <p:notesMasterId r:id="rId4"/>
   </p:notesMasterIdLst>
   <p:sldIdLst>
     <p:sldId id="256" r:id="rId2"/>
+    <p:sldId id="257" r:id="rId3"/>
   </p:sldIdLst>
   <p:sldSz cx="19824700" cy="11898313"/>
   <p:notesSz cx="6858000" cy="9144000"/>
@@ -548,6 +549,90 @@
 </p:notes>
 </file>
 
+<file path=ppt/notesSlides/notesSlide2.xml><?xml version="1.0" encoding="utf-8"?>
+<p:notes xmlns:a="http://schemas.openxmlformats.org/drawingml/2006/main" xmlns:r="http://schemas.openxmlformats.org/officeDocument/2006/relationships" xmlns:p="http://schemas.openxmlformats.org/presentationml/2006/main">
+  <p:cSld>
+    <p:spTree>
+      <p:nvGrpSpPr>
+        <p:cNvPr id="1" name=""/>
+        <p:cNvGrpSpPr/>
+        <p:nvPr/>
+      </p:nvGrpSpPr>
+      <p:grpSpPr>
+        <a:xfrm>
+          <a:off x="0" y="0"/>
+          <a:ext cx="0" cy="0"/>
+          <a:chOff x="0" y="0"/>
+          <a:chExt cx="0" cy="0"/>
+        </a:xfrm>
+      </p:grpSpPr>
+      <p:sp>
+        <p:nvSpPr>
+          <p:cNvPr id="2" name="Slide Image Placeholder 1"/>
+          <p:cNvSpPr>
+            <a:spLocks noGrp="1" noRot="1" noChangeAspect="1"/>
+          </p:cNvSpPr>
+          <p:nvPr>
+            <p:ph type="sldImg"/>
+          </p:nvPr>
+        </p:nvSpPr>
+        <p:spPr/>
+      </p:sp>
+      <p:sp>
+        <p:nvSpPr>
+          <p:cNvPr id="3" name="Notes Placeholder 2"/>
+          <p:cNvSpPr>
+            <a:spLocks noGrp="1"/>
+          </p:cNvSpPr>
+          <p:nvPr>
+            <p:ph type="body" idx="1"/>
+          </p:nvPr>
+        </p:nvSpPr>
+        <p:spPr/>
+        <p:txBody>
+          <a:bodyPr/>
+          <a:lstStyle/>
+          <a:p>
+            <a:endParaRPr lang="en-US"/>
+          </a:p>
+        </p:txBody>
+      </p:sp>
+      <p:sp>
+        <p:nvSpPr>
+          <p:cNvPr id="4" name="Slide Number Placeholder 3"/>
+          <p:cNvSpPr>
+            <a:spLocks noGrp="1"/>
+          </p:cNvSpPr>
+          <p:nvPr>
+            <p:ph type="sldNum" sz="quarter" idx="10"/>
+          </p:nvPr>
+        </p:nvSpPr>
+        <p:spPr/>
+        <p:txBody>
+          <a:bodyPr/>
+          <a:lstStyle/>
+          <a:p>
+            <a:fld id="{D1A087AA-0DB7-1441-AD52-A116D66CDCB7}" type="slidenum">
+              <a:rPr lang="en-US" smtClean="0"/>
+              <a:t>2</a:t>
+            </a:fld>
+            <a:endParaRPr lang="en-US"/>
+          </a:p>
+        </p:txBody>
+      </p:sp>
+    </p:spTree>
+    <p:extLst>
+      <p:ext uri="{BB962C8B-B14F-4D97-AF65-F5344CB8AC3E}">
+        <p14:creationId xmlns:p14="http://schemas.microsoft.com/office/powerpoint/2010/main" val="1392766625"/>
+      </p:ext>
+    </p:extLst>
+  </p:cSld>
+  <p:clrMapOvr>
+    <a:masterClrMapping/>
+  </p:clrMapOvr>
+</p:notes>
+</file>
+
 <file path=ppt/slideLayouts/slideLayout1.xml><?xml version="1.0" encoding="utf-8"?>
 <p:sldLayout xmlns:a="http://schemas.openxmlformats.org/drawingml/2006/main" xmlns:r="http://schemas.openxmlformats.org/officeDocument/2006/relationships" xmlns:p="http://schemas.openxmlformats.org/presentationml/2006/main" type="title" preserve="1">
   <p:cSld name="Title Slide">
@@ -679,7 +764,7 @@
           <a:p>
             <a:fld id="{2349905B-831E-C846-A76E-EAE8342C5A95}" type="datetimeFigureOut">
               <a:rPr lang="en-US" smtClean="0"/>
-              <a:t>7/17/18</a:t>
+              <a:t>7/18/18</a:t>
             </a:fld>
             <a:endParaRPr lang="en-US"/>
           </a:p>
@@ -849,7 +934,7 @@
           <a:p>
             <a:fld id="{2349905B-831E-C846-A76E-EAE8342C5A95}" type="datetimeFigureOut">
               <a:rPr lang="en-US" smtClean="0"/>
-              <a:t>7/17/18</a:t>
+              <a:t>7/18/18</a:t>
             </a:fld>
             <a:endParaRPr lang="en-US"/>
           </a:p>
@@ -1029,7 +1114,7 @@
           <a:p>
             <a:fld id="{2349905B-831E-C846-A76E-EAE8342C5A95}" type="datetimeFigureOut">
               <a:rPr lang="en-US" smtClean="0"/>
-              <a:t>7/17/18</a:t>
+              <a:t>7/18/18</a:t>
             </a:fld>
             <a:endParaRPr lang="en-US"/>
           </a:p>
@@ -1199,7 +1284,7 @@
           <a:p>
             <a:fld id="{2349905B-831E-C846-A76E-EAE8342C5A95}" type="datetimeFigureOut">
               <a:rPr lang="en-US" smtClean="0"/>
-              <a:t>7/17/18</a:t>
+              <a:t>7/18/18</a:t>
             </a:fld>
             <a:endParaRPr lang="en-US"/>
           </a:p>
@@ -1445,7 +1530,7 @@
           <a:p>
             <a:fld id="{2349905B-831E-C846-A76E-EAE8342C5A95}" type="datetimeFigureOut">
               <a:rPr lang="en-US" smtClean="0"/>
-              <a:t>7/17/18</a:t>
+              <a:t>7/18/18</a:t>
             </a:fld>
             <a:endParaRPr lang="en-US"/>
           </a:p>
@@ -1677,7 +1762,7 @@
           <a:p>
             <a:fld id="{2349905B-831E-C846-A76E-EAE8342C5A95}" type="datetimeFigureOut">
               <a:rPr lang="en-US" smtClean="0"/>
-              <a:t>7/17/18</a:t>
+              <a:t>7/18/18</a:t>
             </a:fld>
             <a:endParaRPr lang="en-US"/>
           </a:p>
@@ -2044,7 +2129,7 @@
           <a:p>
             <a:fld id="{2349905B-831E-C846-A76E-EAE8342C5A95}" type="datetimeFigureOut">
               <a:rPr lang="en-US" smtClean="0"/>
-              <a:t>7/17/18</a:t>
+              <a:t>7/18/18</a:t>
             </a:fld>
             <a:endParaRPr lang="en-US"/>
           </a:p>
@@ -2162,7 +2247,7 @@
           <a:p>
             <a:fld id="{2349905B-831E-C846-A76E-EAE8342C5A95}" type="datetimeFigureOut">
               <a:rPr lang="en-US" smtClean="0"/>
-              <a:t>7/17/18</a:t>
+              <a:t>7/18/18</a:t>
             </a:fld>
             <a:endParaRPr lang="en-US"/>
           </a:p>
@@ -2257,7 +2342,7 @@
           <a:p>
             <a:fld id="{2349905B-831E-C846-A76E-EAE8342C5A95}" type="datetimeFigureOut">
               <a:rPr lang="en-US" smtClean="0"/>
-              <a:t>7/17/18</a:t>
+              <a:t>7/18/18</a:t>
             </a:fld>
             <a:endParaRPr lang="en-US"/>
           </a:p>
@@ -2534,7 +2619,7 @@
           <a:p>
             <a:fld id="{2349905B-831E-C846-A76E-EAE8342C5A95}" type="datetimeFigureOut">
               <a:rPr lang="en-US" smtClean="0"/>
-              <a:t>7/17/18</a:t>
+              <a:t>7/18/18</a:t>
             </a:fld>
             <a:endParaRPr lang="en-US"/>
           </a:p>
@@ -2791,7 +2876,7 @@
           <a:p>
             <a:fld id="{2349905B-831E-C846-A76E-EAE8342C5A95}" type="datetimeFigureOut">
               <a:rPr lang="en-US" smtClean="0"/>
-              <a:t>7/17/18</a:t>
+              <a:t>7/18/18</a:t>
             </a:fld>
             <a:endParaRPr lang="en-US"/>
           </a:p>
@@ -3004,7 +3089,7 @@
           <a:p>
             <a:fld id="{2349905B-831E-C846-A76E-EAE8342C5A95}" type="datetimeFigureOut">
               <a:rPr lang="en-US" smtClean="0"/>
-              <a:t>7/17/18</a:t>
+              <a:t>7/18/18</a:t>
             </a:fld>
             <a:endParaRPr lang="en-US"/>
           </a:p>
@@ -7549,10 +7634,3606 @@
           </a:p>
         </p:txBody>
       </p:sp>
+      <p:sp>
+        <p:nvSpPr>
+          <p:cNvPr id="18" name="TextBox 17">
+            <a:extLst>
+              <a:ext uri="{FF2B5EF4-FFF2-40B4-BE49-F238E27FC236}">
+                <a16:creationId xmlns:a16="http://schemas.microsoft.com/office/drawing/2014/main" id="{779E9EF0-B7C2-0944-B322-8F1845D15521}"/>
+              </a:ext>
+            </a:extLst>
+          </p:cNvPr>
+          <p:cNvSpPr txBox="1"/>
+          <p:nvPr/>
+        </p:nvSpPr>
+        <p:spPr>
+          <a:xfrm>
+            <a:off x="14362500" y="9647085"/>
+            <a:ext cx="4214191" cy="1754326"/>
+          </a:xfrm>
+          <a:prstGeom prst="rect">
+            <a:avLst/>
+          </a:prstGeom>
+          <a:noFill/>
+        </p:spPr>
+        <p:txBody>
+          <a:bodyPr wrap="square" rtlCol="0">
+            <a:spAutoFit/>
+          </a:bodyPr>
+          <a:lstStyle/>
+          <a:p>
+            <a:r>
+              <a:rPr lang="en-US" sz="5400" b="1">
+                <a:solidFill>
+                  <a:srgbClr val="FF0000"/>
+                </a:solidFill>
+              </a:rPr>
+              <a:t>OLD STRUCTURE</a:t>
+            </a:r>
+          </a:p>
+        </p:txBody>
+      </p:sp>
     </p:spTree>
     <p:extLst>
       <p:ext uri="{BB962C8B-B14F-4D97-AF65-F5344CB8AC3E}">
         <p14:creationId xmlns:p14="http://schemas.microsoft.com/office/powerpoint/2010/main" val="64180301"/>
+      </p:ext>
+    </p:extLst>
+  </p:cSld>
+  <p:clrMapOvr>
+    <a:masterClrMapping/>
+  </p:clrMapOvr>
+</p:sld>
+</file>
+
+<file path=ppt/slides/slide2.xml><?xml version="1.0" encoding="utf-8"?>
+<p:sld xmlns:a="http://schemas.openxmlformats.org/drawingml/2006/main" xmlns:r="http://schemas.openxmlformats.org/officeDocument/2006/relationships" xmlns:p="http://schemas.openxmlformats.org/presentationml/2006/main">
+  <p:cSld>
+    <p:spTree>
+      <p:nvGrpSpPr>
+        <p:cNvPr id="1" name=""/>
+        <p:cNvGrpSpPr/>
+        <p:nvPr/>
+      </p:nvGrpSpPr>
+      <p:grpSpPr>
+        <a:xfrm>
+          <a:off x="0" y="0"/>
+          <a:ext cx="0" cy="0"/>
+          <a:chOff x="0" y="0"/>
+          <a:chExt cx="0" cy="0"/>
+        </a:xfrm>
+      </p:grpSpPr>
+      <p:sp>
+        <p:nvSpPr>
+          <p:cNvPr id="5" name="Rectangle 4">
+            <a:extLst>
+              <a:ext uri="{FF2B5EF4-FFF2-40B4-BE49-F238E27FC236}">
+                <a16:creationId xmlns:a16="http://schemas.microsoft.com/office/drawing/2014/main" id="{7768814F-F5D7-E04B-B7B0-FD2D7432AAD4}"/>
+              </a:ext>
+            </a:extLst>
+          </p:cNvPr>
+          <p:cNvSpPr/>
+          <p:nvPr/>
+        </p:nvSpPr>
+        <p:spPr>
+          <a:xfrm>
+            <a:off x="7131106" y="350487"/>
+            <a:ext cx="1802757" cy="7802136"/>
+          </a:xfrm>
+          <a:prstGeom prst="rect">
+            <a:avLst/>
+          </a:prstGeom>
+          <a:ln w="38100">
+            <a:solidFill>
+              <a:schemeClr val="accent1"/>
+            </a:solidFill>
+          </a:ln>
+        </p:spPr>
+        <p:txBody>
+          <a:bodyPr wrap="square">
+            <a:spAutoFit/>
+          </a:bodyPr>
+          <a:lstStyle/>
+          <a:p>
+            <a:pPr algn="ctr"/>
+            <a:r>
+              <a:rPr lang="en-GB" sz="1100" b="1" dirty="0" err="1">
+                <a:solidFill>
+                  <a:srgbClr val="000000"/>
+                </a:solidFill>
+                <a:latin typeface="Arial" panose="020B0604020202020204" pitchFamily="34" charset="0"/>
+              </a:rPr>
+              <a:t>QuEST.h</a:t>
+            </a:r>
+            <a:endParaRPr lang="en-GB" sz="1000" b="1" dirty="0"/>
+          </a:p>
+          <a:p>
+            <a:br>
+              <a:rPr lang="en-GB" sz="1000" dirty="0"/>
+            </a:br>
+            <a:r>
+              <a:rPr lang="en-GB" sz="1000" dirty="0" err="1">
+                <a:solidFill>
+                  <a:schemeClr val="accent1"/>
+                </a:solidFill>
+                <a:latin typeface="Arial" panose="020B0604020202020204" pitchFamily="34" charset="0"/>
+              </a:rPr>
+              <a:t>calcTotalProbability</a:t>
+            </a:r>
+            <a:endParaRPr lang="en-GB" sz="1000" dirty="0">
+              <a:solidFill>
+                <a:schemeClr val="accent1"/>
+              </a:solidFill>
+            </a:endParaRPr>
+          </a:p>
+          <a:p>
+            <a:r>
+              <a:rPr lang="en-GB" sz="1000" dirty="0" err="1">
+                <a:solidFill>
+                  <a:schemeClr val="accent1"/>
+                </a:solidFill>
+                <a:latin typeface="Arial" panose="020B0604020202020204" pitchFamily="34" charset="0"/>
+              </a:rPr>
+              <a:t>closeQuESTEnv</a:t>
+            </a:r>
+            <a:endParaRPr lang="en-GB" sz="1000" dirty="0">
+              <a:solidFill>
+                <a:schemeClr val="accent1"/>
+              </a:solidFill>
+            </a:endParaRPr>
+          </a:p>
+          <a:p>
+            <a:r>
+              <a:rPr lang="en-GB" sz="1000" dirty="0" err="1">
+                <a:solidFill>
+                  <a:schemeClr val="accent1"/>
+                </a:solidFill>
+                <a:latin typeface="Arial" panose="020B0604020202020204" pitchFamily="34" charset="0"/>
+              </a:rPr>
+              <a:t>collapseToOutcome</a:t>
+            </a:r>
+            <a:endParaRPr lang="en-GB" sz="1000" dirty="0">
+              <a:solidFill>
+                <a:schemeClr val="accent1"/>
+              </a:solidFill>
+            </a:endParaRPr>
+          </a:p>
+          <a:p>
+            <a:r>
+              <a:rPr lang="en-GB" sz="1000" dirty="0" err="1">
+                <a:solidFill>
+                  <a:schemeClr val="accent1"/>
+                </a:solidFill>
+                <a:latin typeface="Arial" panose="020B0604020202020204" pitchFamily="34" charset="0"/>
+              </a:rPr>
+              <a:t>compactUnitary</a:t>
+            </a:r>
+            <a:endParaRPr lang="en-GB" sz="1000" dirty="0">
+              <a:solidFill>
+                <a:schemeClr val="accent1"/>
+              </a:solidFill>
+            </a:endParaRPr>
+          </a:p>
+          <a:p>
+            <a:r>
+              <a:rPr lang="en-GB" sz="1000" dirty="0" err="1">
+                <a:solidFill>
+                  <a:schemeClr val="accent1"/>
+                </a:solidFill>
+                <a:latin typeface="Arial" panose="020B0604020202020204" pitchFamily="34" charset="0"/>
+              </a:rPr>
+              <a:t>controlledCompactUnitary</a:t>
+            </a:r>
+            <a:endParaRPr lang="en-GB" sz="1000" dirty="0">
+              <a:solidFill>
+                <a:schemeClr val="accent1"/>
+              </a:solidFill>
+            </a:endParaRPr>
+          </a:p>
+          <a:p>
+            <a:r>
+              <a:rPr lang="en-GB" sz="1000" dirty="0" err="1">
+                <a:solidFill>
+                  <a:schemeClr val="accent1"/>
+                </a:solidFill>
+                <a:latin typeface="Arial" panose="020B0604020202020204" pitchFamily="34" charset="0"/>
+              </a:rPr>
+              <a:t>controlledNot</a:t>
+            </a:r>
+            <a:endParaRPr lang="en-GB" sz="1000" dirty="0">
+              <a:solidFill>
+                <a:schemeClr val="accent1"/>
+              </a:solidFill>
+            </a:endParaRPr>
+          </a:p>
+          <a:p>
+            <a:r>
+              <a:rPr lang="en-GB" sz="1000" dirty="0" err="1">
+                <a:solidFill>
+                  <a:schemeClr val="accent1"/>
+                </a:solidFill>
+                <a:latin typeface="Arial" panose="020B0604020202020204" pitchFamily="34" charset="0"/>
+              </a:rPr>
+              <a:t>controlledPhaseGate</a:t>
+            </a:r>
+            <a:endParaRPr lang="en-GB" sz="1000" dirty="0">
+              <a:solidFill>
+                <a:schemeClr val="accent1"/>
+              </a:solidFill>
+            </a:endParaRPr>
+          </a:p>
+          <a:p>
+            <a:r>
+              <a:rPr lang="en-GB" sz="1000" dirty="0" err="1">
+                <a:solidFill>
+                  <a:schemeClr val="accent1"/>
+                </a:solidFill>
+                <a:latin typeface="Arial" panose="020B0604020202020204" pitchFamily="34" charset="0"/>
+              </a:rPr>
+              <a:t>controlledRotateAroundAxis</a:t>
+            </a:r>
+            <a:endParaRPr lang="en-GB" sz="1000" dirty="0">
+              <a:solidFill>
+                <a:schemeClr val="accent1"/>
+              </a:solidFill>
+            </a:endParaRPr>
+          </a:p>
+          <a:p>
+            <a:r>
+              <a:rPr lang="en-GB" sz="1000" dirty="0" err="1">
+                <a:solidFill>
+                  <a:schemeClr val="accent1"/>
+                </a:solidFill>
+                <a:latin typeface="Arial" panose="020B0604020202020204" pitchFamily="34" charset="0"/>
+              </a:rPr>
+              <a:t>controlledRotateX</a:t>
+            </a:r>
+            <a:endParaRPr lang="en-GB" sz="1000" dirty="0">
+              <a:solidFill>
+                <a:schemeClr val="accent1"/>
+              </a:solidFill>
+            </a:endParaRPr>
+          </a:p>
+          <a:p>
+            <a:r>
+              <a:rPr lang="en-GB" sz="1000" dirty="0" err="1">
+                <a:solidFill>
+                  <a:schemeClr val="accent1"/>
+                </a:solidFill>
+                <a:latin typeface="Arial" panose="020B0604020202020204" pitchFamily="34" charset="0"/>
+              </a:rPr>
+              <a:t>controlledRotateY</a:t>
+            </a:r>
+            <a:endParaRPr lang="en-GB" sz="1000" dirty="0">
+              <a:solidFill>
+                <a:schemeClr val="accent1"/>
+              </a:solidFill>
+            </a:endParaRPr>
+          </a:p>
+          <a:p>
+            <a:r>
+              <a:rPr lang="en-GB" sz="1000" dirty="0" err="1">
+                <a:solidFill>
+                  <a:schemeClr val="accent1"/>
+                </a:solidFill>
+                <a:latin typeface="Arial" panose="020B0604020202020204" pitchFamily="34" charset="0"/>
+              </a:rPr>
+              <a:t>controlledRotateZ</a:t>
+            </a:r>
+            <a:endParaRPr lang="en-GB" sz="1000" dirty="0">
+              <a:solidFill>
+                <a:schemeClr val="accent1"/>
+              </a:solidFill>
+            </a:endParaRPr>
+          </a:p>
+          <a:p>
+            <a:r>
+              <a:rPr lang="en-GB" sz="1000" dirty="0" err="1">
+                <a:solidFill>
+                  <a:schemeClr val="accent1"/>
+                </a:solidFill>
+                <a:latin typeface="Arial" panose="020B0604020202020204" pitchFamily="34" charset="0"/>
+              </a:rPr>
+              <a:t>controlledUnitary</a:t>
+            </a:r>
+            <a:endParaRPr lang="en-GB" sz="1000" dirty="0">
+              <a:solidFill>
+                <a:schemeClr val="accent1"/>
+              </a:solidFill>
+            </a:endParaRPr>
+          </a:p>
+          <a:p>
+            <a:r>
+              <a:rPr lang="en-GB" sz="1000" dirty="0" err="1">
+                <a:solidFill>
+                  <a:schemeClr val="accent1"/>
+                </a:solidFill>
+                <a:latin typeface="Arial" panose="020B0604020202020204" pitchFamily="34" charset="0"/>
+              </a:rPr>
+              <a:t>createMultiQubit</a:t>
+            </a:r>
+            <a:endParaRPr lang="en-GB" sz="1000" dirty="0">
+              <a:solidFill>
+                <a:schemeClr val="accent1"/>
+              </a:solidFill>
+            </a:endParaRPr>
+          </a:p>
+          <a:p>
+            <a:r>
+              <a:rPr lang="en-GB" sz="1000" dirty="0" err="1">
+                <a:solidFill>
+                  <a:schemeClr val="accent1"/>
+                </a:solidFill>
+                <a:latin typeface="Arial" panose="020B0604020202020204" pitchFamily="34" charset="0"/>
+              </a:rPr>
+              <a:t>destroyMultiQubit</a:t>
+            </a:r>
+            <a:endParaRPr lang="en-GB" sz="1000" dirty="0">
+              <a:solidFill>
+                <a:schemeClr val="accent1"/>
+              </a:solidFill>
+            </a:endParaRPr>
+          </a:p>
+          <a:p>
+            <a:r>
+              <a:rPr lang="en-GB" sz="1000" dirty="0" err="1">
+                <a:solidFill>
+                  <a:schemeClr val="accent1"/>
+                </a:solidFill>
+                <a:latin typeface="Arial" panose="020B0604020202020204" pitchFamily="34" charset="0"/>
+              </a:rPr>
+              <a:t>findProbabilityOfOutcome</a:t>
+            </a:r>
+            <a:endParaRPr lang="en-GB" sz="1000" dirty="0">
+              <a:solidFill>
+                <a:schemeClr val="accent1"/>
+              </a:solidFill>
+            </a:endParaRPr>
+          </a:p>
+          <a:p>
+            <a:r>
+              <a:rPr lang="en-GB" sz="1000" dirty="0" err="1">
+                <a:solidFill>
+                  <a:schemeClr val="accent1"/>
+                </a:solidFill>
+                <a:latin typeface="Arial" panose="020B0604020202020204" pitchFamily="34" charset="0"/>
+              </a:rPr>
+              <a:t>getEnvironmentString</a:t>
+            </a:r>
+            <a:endParaRPr lang="en-GB" sz="1000" dirty="0">
+              <a:solidFill>
+                <a:schemeClr val="accent1"/>
+              </a:solidFill>
+            </a:endParaRPr>
+          </a:p>
+          <a:p>
+            <a:r>
+              <a:rPr lang="en-GB" sz="1000" dirty="0" err="1">
+                <a:solidFill>
+                  <a:schemeClr val="accent1"/>
+                </a:solidFill>
+                <a:latin typeface="Arial" panose="020B0604020202020204" pitchFamily="34" charset="0"/>
+              </a:rPr>
+              <a:t>getImagAmpEl</a:t>
+            </a:r>
+            <a:endParaRPr lang="en-GB" sz="1000" dirty="0">
+              <a:solidFill>
+                <a:schemeClr val="accent1"/>
+              </a:solidFill>
+            </a:endParaRPr>
+          </a:p>
+          <a:p>
+            <a:r>
+              <a:rPr lang="en-GB" sz="1000" dirty="0" err="1">
+                <a:solidFill>
+                  <a:schemeClr val="accent1"/>
+                </a:solidFill>
+                <a:latin typeface="Arial" panose="020B0604020202020204" pitchFamily="34" charset="0"/>
+              </a:rPr>
+              <a:t>getNumAmps</a:t>
+            </a:r>
+            <a:endParaRPr lang="en-GB" sz="1000" dirty="0">
+              <a:solidFill>
+                <a:schemeClr val="accent1"/>
+              </a:solidFill>
+            </a:endParaRPr>
+          </a:p>
+          <a:p>
+            <a:r>
+              <a:rPr lang="en-GB" sz="1000" dirty="0" err="1">
+                <a:solidFill>
+                  <a:schemeClr val="accent1"/>
+                </a:solidFill>
+                <a:latin typeface="Arial" panose="020B0604020202020204" pitchFamily="34" charset="0"/>
+              </a:rPr>
+              <a:t>getNumQubits</a:t>
+            </a:r>
+            <a:endParaRPr lang="en-GB" sz="1000" dirty="0">
+              <a:solidFill>
+                <a:schemeClr val="accent1"/>
+              </a:solidFill>
+            </a:endParaRPr>
+          </a:p>
+          <a:p>
+            <a:r>
+              <a:rPr lang="en-GB" sz="1000" dirty="0" err="1">
+                <a:solidFill>
+                  <a:schemeClr val="accent1"/>
+                </a:solidFill>
+                <a:latin typeface="Arial" panose="020B0604020202020204" pitchFamily="34" charset="0"/>
+              </a:rPr>
+              <a:t>getProbEl</a:t>
+            </a:r>
+            <a:endParaRPr lang="en-GB" sz="1000" dirty="0">
+              <a:solidFill>
+                <a:schemeClr val="accent1"/>
+              </a:solidFill>
+            </a:endParaRPr>
+          </a:p>
+          <a:p>
+            <a:r>
+              <a:rPr lang="en-GB" sz="1000" dirty="0" err="1">
+                <a:solidFill>
+                  <a:schemeClr val="accent1"/>
+                </a:solidFill>
+                <a:latin typeface="Arial" panose="020B0604020202020204" pitchFamily="34" charset="0"/>
+              </a:rPr>
+              <a:t>getRealAmpEl</a:t>
+            </a:r>
+            <a:endParaRPr lang="en-GB" sz="1000" dirty="0">
+              <a:solidFill>
+                <a:schemeClr val="accent1"/>
+              </a:solidFill>
+            </a:endParaRPr>
+          </a:p>
+          <a:p>
+            <a:r>
+              <a:rPr lang="en-GB" sz="1000" dirty="0" err="1">
+                <a:solidFill>
+                  <a:schemeClr val="accent1"/>
+                </a:solidFill>
+                <a:latin typeface="Arial" panose="020B0604020202020204" pitchFamily="34" charset="0"/>
+              </a:rPr>
+              <a:t>hadamard</a:t>
+            </a:r>
+            <a:endParaRPr lang="en-GB" sz="1000" dirty="0">
+              <a:solidFill>
+                <a:schemeClr val="accent1"/>
+              </a:solidFill>
+            </a:endParaRPr>
+          </a:p>
+          <a:p>
+            <a:r>
+              <a:rPr lang="en-GB" sz="1000" dirty="0" err="1">
+                <a:solidFill>
+                  <a:schemeClr val="accent1"/>
+                </a:solidFill>
+                <a:latin typeface="Arial" panose="020B0604020202020204" pitchFamily="34" charset="0"/>
+              </a:rPr>
+              <a:t>initClassicalState</a:t>
+            </a:r>
+            <a:endParaRPr lang="en-GB" sz="1000" dirty="0">
+              <a:solidFill>
+                <a:schemeClr val="accent1"/>
+              </a:solidFill>
+            </a:endParaRPr>
+          </a:p>
+          <a:p>
+            <a:r>
+              <a:rPr lang="en-GB" sz="1000" dirty="0" err="1">
+                <a:solidFill>
+                  <a:schemeClr val="accent1"/>
+                </a:solidFill>
+                <a:latin typeface="Arial" panose="020B0604020202020204" pitchFamily="34" charset="0"/>
+              </a:rPr>
+              <a:t>initQuESTEnv</a:t>
+            </a:r>
+            <a:endParaRPr lang="en-GB" sz="1000" dirty="0">
+              <a:solidFill>
+                <a:schemeClr val="accent1"/>
+              </a:solidFill>
+            </a:endParaRPr>
+          </a:p>
+          <a:p>
+            <a:r>
+              <a:rPr lang="en-GB" sz="1000" dirty="0" err="1">
+                <a:solidFill>
+                  <a:schemeClr val="accent1"/>
+                </a:solidFill>
+                <a:latin typeface="Arial" panose="020B0604020202020204" pitchFamily="34" charset="0"/>
+              </a:rPr>
+              <a:t>initStatePlus</a:t>
+            </a:r>
+            <a:endParaRPr lang="en-GB" sz="1000" dirty="0">
+              <a:solidFill>
+                <a:schemeClr val="accent1"/>
+              </a:solidFill>
+            </a:endParaRPr>
+          </a:p>
+          <a:p>
+            <a:r>
+              <a:rPr lang="en-GB" sz="1000" dirty="0" err="1">
+                <a:solidFill>
+                  <a:schemeClr val="accent1"/>
+                </a:solidFill>
+                <a:latin typeface="Arial" panose="020B0604020202020204" pitchFamily="34" charset="0"/>
+              </a:rPr>
+              <a:t>initStateZero</a:t>
+            </a:r>
+            <a:endParaRPr lang="en-GB" sz="1000" dirty="0">
+              <a:solidFill>
+                <a:schemeClr val="accent1"/>
+              </a:solidFill>
+            </a:endParaRPr>
+          </a:p>
+          <a:p>
+            <a:r>
+              <a:rPr lang="en-GB" sz="1000" dirty="0">
+                <a:solidFill>
+                  <a:schemeClr val="accent1"/>
+                </a:solidFill>
+                <a:latin typeface="Arial" panose="020B0604020202020204" pitchFamily="34" charset="0"/>
+              </a:rPr>
+              <a:t>measure</a:t>
+            </a:r>
+            <a:endParaRPr lang="en-GB" sz="1000" dirty="0">
+              <a:solidFill>
+                <a:schemeClr val="accent1"/>
+              </a:solidFill>
+            </a:endParaRPr>
+          </a:p>
+          <a:p>
+            <a:r>
+              <a:rPr lang="en-GB" sz="1000" dirty="0" err="1">
+                <a:solidFill>
+                  <a:schemeClr val="accent1"/>
+                </a:solidFill>
+                <a:latin typeface="Arial" panose="020B0604020202020204" pitchFamily="34" charset="0"/>
+              </a:rPr>
+              <a:t>measureWithStats</a:t>
+            </a:r>
+            <a:endParaRPr lang="en-GB" sz="1000" dirty="0">
+              <a:solidFill>
+                <a:schemeClr val="accent1"/>
+              </a:solidFill>
+            </a:endParaRPr>
+          </a:p>
+          <a:p>
+            <a:r>
+              <a:rPr lang="en-GB" sz="1000" dirty="0" err="1">
+                <a:solidFill>
+                  <a:schemeClr val="accent1"/>
+                </a:solidFill>
+                <a:latin typeface="Arial" panose="020B0604020202020204" pitchFamily="34" charset="0"/>
+              </a:rPr>
+              <a:t>multiControlledPhaseGate</a:t>
+            </a:r>
+            <a:endParaRPr lang="en-GB" sz="1000" dirty="0">
+              <a:solidFill>
+                <a:schemeClr val="accent1"/>
+              </a:solidFill>
+            </a:endParaRPr>
+          </a:p>
+          <a:p>
+            <a:r>
+              <a:rPr lang="en-GB" sz="1000" dirty="0" err="1">
+                <a:solidFill>
+                  <a:schemeClr val="accent1"/>
+                </a:solidFill>
+                <a:latin typeface="Arial" panose="020B0604020202020204" pitchFamily="34" charset="0"/>
+              </a:rPr>
+              <a:t>multiControlledUnitary</a:t>
+            </a:r>
+            <a:endParaRPr lang="en-GB" sz="1000" dirty="0">
+              <a:solidFill>
+                <a:schemeClr val="accent1"/>
+              </a:solidFill>
+            </a:endParaRPr>
+          </a:p>
+          <a:p>
+            <a:r>
+              <a:rPr lang="en-GB" sz="1000" dirty="0" err="1">
+                <a:solidFill>
+                  <a:schemeClr val="accent1"/>
+                </a:solidFill>
+                <a:latin typeface="Arial" panose="020B0604020202020204" pitchFamily="34" charset="0"/>
+              </a:rPr>
+              <a:t>reportMultiQubitParams</a:t>
+            </a:r>
+            <a:endParaRPr lang="en-GB" sz="1000" dirty="0">
+              <a:solidFill>
+                <a:schemeClr val="accent1"/>
+              </a:solidFill>
+            </a:endParaRPr>
+          </a:p>
+          <a:p>
+            <a:r>
+              <a:rPr lang="en-GB" sz="1000" dirty="0" err="1">
+                <a:solidFill>
+                  <a:schemeClr val="accent1"/>
+                </a:solidFill>
+                <a:latin typeface="Arial" panose="020B0604020202020204" pitchFamily="34" charset="0"/>
+              </a:rPr>
+              <a:t>reportQuESTEnv</a:t>
+            </a:r>
+            <a:endParaRPr lang="en-GB" sz="1000" dirty="0">
+              <a:solidFill>
+                <a:schemeClr val="accent1"/>
+              </a:solidFill>
+            </a:endParaRPr>
+          </a:p>
+          <a:p>
+            <a:r>
+              <a:rPr lang="en-GB" sz="1000" dirty="0" err="1">
+                <a:solidFill>
+                  <a:schemeClr val="accent1"/>
+                </a:solidFill>
+                <a:latin typeface="Arial" panose="020B0604020202020204" pitchFamily="34" charset="0"/>
+              </a:rPr>
+              <a:t>reportState</a:t>
+            </a:r>
+            <a:endParaRPr lang="en-GB" sz="1000" dirty="0">
+              <a:solidFill>
+                <a:schemeClr val="accent1"/>
+              </a:solidFill>
+            </a:endParaRPr>
+          </a:p>
+          <a:p>
+            <a:r>
+              <a:rPr lang="en-GB" sz="1000" dirty="0" err="1">
+                <a:solidFill>
+                  <a:schemeClr val="accent1"/>
+                </a:solidFill>
+                <a:latin typeface="Arial" panose="020B0604020202020204" pitchFamily="34" charset="0"/>
+              </a:rPr>
+              <a:t>reportStateToScreen</a:t>
+            </a:r>
+            <a:endParaRPr lang="en-GB" sz="1000" dirty="0">
+              <a:solidFill>
+                <a:schemeClr val="accent1"/>
+              </a:solidFill>
+            </a:endParaRPr>
+          </a:p>
+          <a:p>
+            <a:r>
+              <a:rPr lang="en-GB" sz="1000" dirty="0" err="1">
+                <a:solidFill>
+                  <a:schemeClr val="accent1"/>
+                </a:solidFill>
+                <a:latin typeface="Arial" panose="020B0604020202020204" pitchFamily="34" charset="0"/>
+              </a:rPr>
+              <a:t>rotateAroundAxis</a:t>
+            </a:r>
+            <a:endParaRPr lang="en-GB" sz="1000" dirty="0">
+              <a:solidFill>
+                <a:schemeClr val="accent1"/>
+              </a:solidFill>
+            </a:endParaRPr>
+          </a:p>
+          <a:p>
+            <a:r>
+              <a:rPr lang="en-GB" sz="1000" dirty="0" err="1">
+                <a:solidFill>
+                  <a:schemeClr val="accent1"/>
+                </a:solidFill>
+                <a:latin typeface="Arial" panose="020B0604020202020204" pitchFamily="34" charset="0"/>
+              </a:rPr>
+              <a:t>rotateX</a:t>
+            </a:r>
+            <a:endParaRPr lang="en-GB" sz="1000" dirty="0">
+              <a:solidFill>
+                <a:schemeClr val="accent1"/>
+              </a:solidFill>
+            </a:endParaRPr>
+          </a:p>
+          <a:p>
+            <a:r>
+              <a:rPr lang="en-GB" sz="1000" dirty="0" err="1">
+                <a:solidFill>
+                  <a:schemeClr val="accent1"/>
+                </a:solidFill>
+                <a:latin typeface="Arial" panose="020B0604020202020204" pitchFamily="34" charset="0"/>
+              </a:rPr>
+              <a:t>rotateY</a:t>
+            </a:r>
+            <a:endParaRPr lang="en-GB" sz="1000" dirty="0">
+              <a:solidFill>
+                <a:schemeClr val="accent1"/>
+              </a:solidFill>
+            </a:endParaRPr>
+          </a:p>
+          <a:p>
+            <a:r>
+              <a:rPr lang="en-GB" sz="1000" dirty="0" err="1">
+                <a:solidFill>
+                  <a:schemeClr val="accent1"/>
+                </a:solidFill>
+                <a:latin typeface="Arial" panose="020B0604020202020204" pitchFamily="34" charset="0"/>
+              </a:rPr>
+              <a:t>rotateZ</a:t>
+            </a:r>
+            <a:endParaRPr lang="en-GB" sz="1000" dirty="0">
+              <a:solidFill>
+                <a:schemeClr val="accent1"/>
+              </a:solidFill>
+            </a:endParaRPr>
+          </a:p>
+          <a:p>
+            <a:r>
+              <a:rPr lang="en-GB" sz="1000" dirty="0" err="1">
+                <a:solidFill>
+                  <a:schemeClr val="accent1"/>
+                </a:solidFill>
+                <a:latin typeface="Arial" panose="020B0604020202020204" pitchFamily="34" charset="0"/>
+              </a:rPr>
+              <a:t>sGate</a:t>
+            </a:r>
+            <a:endParaRPr lang="en-GB" sz="1000" dirty="0">
+              <a:solidFill>
+                <a:schemeClr val="accent1"/>
+              </a:solidFill>
+            </a:endParaRPr>
+          </a:p>
+          <a:p>
+            <a:r>
+              <a:rPr lang="en-GB" sz="1000" dirty="0" err="1">
+                <a:solidFill>
+                  <a:schemeClr val="accent1"/>
+                </a:solidFill>
+                <a:latin typeface="Arial" panose="020B0604020202020204" pitchFamily="34" charset="0"/>
+              </a:rPr>
+              <a:t>seedQuEST</a:t>
+            </a:r>
+            <a:endParaRPr lang="en-GB" sz="1000" dirty="0">
+              <a:solidFill>
+                <a:schemeClr val="accent1"/>
+              </a:solidFill>
+            </a:endParaRPr>
+          </a:p>
+          <a:p>
+            <a:r>
+              <a:rPr lang="en-GB" sz="1000" dirty="0" err="1">
+                <a:solidFill>
+                  <a:schemeClr val="accent1"/>
+                </a:solidFill>
+                <a:latin typeface="Arial" panose="020B0604020202020204" pitchFamily="34" charset="0"/>
+              </a:rPr>
+              <a:t>seedQuESTDefault</a:t>
+            </a:r>
+            <a:endParaRPr lang="en-GB" sz="1000" dirty="0">
+              <a:solidFill>
+                <a:schemeClr val="accent1"/>
+              </a:solidFill>
+            </a:endParaRPr>
+          </a:p>
+          <a:p>
+            <a:r>
+              <a:rPr lang="en-GB" sz="1000" dirty="0" err="1">
+                <a:solidFill>
+                  <a:schemeClr val="accent1"/>
+                </a:solidFill>
+                <a:latin typeface="Arial" panose="020B0604020202020204" pitchFamily="34" charset="0"/>
+              </a:rPr>
+              <a:t>sigmaX</a:t>
+            </a:r>
+            <a:endParaRPr lang="en-GB" sz="1000" dirty="0">
+              <a:solidFill>
+                <a:schemeClr val="accent1"/>
+              </a:solidFill>
+            </a:endParaRPr>
+          </a:p>
+          <a:p>
+            <a:r>
+              <a:rPr lang="en-GB" sz="1000" dirty="0" err="1">
+                <a:solidFill>
+                  <a:schemeClr val="accent1"/>
+                </a:solidFill>
+                <a:latin typeface="Arial" panose="020B0604020202020204" pitchFamily="34" charset="0"/>
+              </a:rPr>
+              <a:t>sigmaY</a:t>
+            </a:r>
+            <a:endParaRPr lang="en-GB" sz="1000" dirty="0">
+              <a:solidFill>
+                <a:schemeClr val="accent1"/>
+              </a:solidFill>
+            </a:endParaRPr>
+          </a:p>
+          <a:p>
+            <a:r>
+              <a:rPr lang="en-GB" sz="1000" dirty="0" err="1">
+                <a:solidFill>
+                  <a:schemeClr val="accent1"/>
+                </a:solidFill>
+                <a:latin typeface="Arial" panose="020B0604020202020204" pitchFamily="34" charset="0"/>
+              </a:rPr>
+              <a:t>sigmaZ</a:t>
+            </a:r>
+            <a:endParaRPr lang="en-GB" sz="1000" dirty="0">
+              <a:solidFill>
+                <a:schemeClr val="accent1"/>
+              </a:solidFill>
+            </a:endParaRPr>
+          </a:p>
+          <a:p>
+            <a:r>
+              <a:rPr lang="en-GB" sz="1000" dirty="0" err="1">
+                <a:solidFill>
+                  <a:schemeClr val="accent1"/>
+                </a:solidFill>
+                <a:latin typeface="Arial" panose="020B0604020202020204" pitchFamily="34" charset="0"/>
+              </a:rPr>
+              <a:t>syncQuESTEnv</a:t>
+            </a:r>
+            <a:endParaRPr lang="en-GB" sz="1000" dirty="0">
+              <a:solidFill>
+                <a:schemeClr val="accent1"/>
+              </a:solidFill>
+            </a:endParaRPr>
+          </a:p>
+          <a:p>
+            <a:r>
+              <a:rPr lang="en-GB" sz="1000" dirty="0" err="1">
+                <a:solidFill>
+                  <a:schemeClr val="accent1"/>
+                </a:solidFill>
+                <a:latin typeface="Arial" panose="020B0604020202020204" pitchFamily="34" charset="0"/>
+              </a:rPr>
+              <a:t>syncQuESTSuccess</a:t>
+            </a:r>
+            <a:endParaRPr lang="en-GB" sz="1000" dirty="0">
+              <a:solidFill>
+                <a:schemeClr val="accent1"/>
+              </a:solidFill>
+            </a:endParaRPr>
+          </a:p>
+          <a:p>
+            <a:r>
+              <a:rPr lang="en-GB" sz="1000" dirty="0" err="1">
+                <a:solidFill>
+                  <a:schemeClr val="accent1"/>
+                </a:solidFill>
+                <a:latin typeface="Arial" panose="020B0604020202020204" pitchFamily="34" charset="0"/>
+              </a:rPr>
+              <a:t>tGate</a:t>
+            </a:r>
+            <a:endParaRPr lang="en-GB" sz="1000" dirty="0">
+              <a:solidFill>
+                <a:schemeClr val="accent1"/>
+              </a:solidFill>
+            </a:endParaRPr>
+          </a:p>
+          <a:p>
+            <a:r>
+              <a:rPr lang="en-GB" sz="1000">
+                <a:solidFill>
+                  <a:schemeClr val="accent1"/>
+                </a:solidFill>
+                <a:latin typeface="Arial" panose="020B0604020202020204" pitchFamily="34" charset="0"/>
+              </a:rPr>
+              <a:t>unitary</a:t>
+            </a:r>
+            <a:endParaRPr lang="en-US" sz="1000" dirty="0">
+              <a:solidFill>
+                <a:schemeClr val="accent1"/>
+              </a:solidFill>
+            </a:endParaRPr>
+          </a:p>
+        </p:txBody>
+      </p:sp>
+      <p:sp>
+        <p:nvSpPr>
+          <p:cNvPr id="8" name="Rectangle 7">
+            <a:extLst>
+              <a:ext uri="{FF2B5EF4-FFF2-40B4-BE49-F238E27FC236}">
+                <a16:creationId xmlns:a16="http://schemas.microsoft.com/office/drawing/2014/main" id="{56C784E7-BD59-504D-866E-501B2FAAD2D8}"/>
+              </a:ext>
+            </a:extLst>
+          </p:cNvPr>
+          <p:cNvSpPr/>
+          <p:nvPr/>
+        </p:nvSpPr>
+        <p:spPr>
+          <a:xfrm>
+            <a:off x="301170" y="396618"/>
+            <a:ext cx="1886602" cy="10726013"/>
+          </a:xfrm>
+          <a:prstGeom prst="rect">
+            <a:avLst/>
+          </a:prstGeom>
+          <a:ln>
+            <a:solidFill>
+              <a:schemeClr val="tx1"/>
+            </a:solidFill>
+          </a:ln>
+        </p:spPr>
+        <p:txBody>
+          <a:bodyPr wrap="square">
+            <a:spAutoFit/>
+          </a:bodyPr>
+          <a:lstStyle/>
+          <a:p>
+            <a:pPr algn="ctr"/>
+            <a:r>
+              <a:rPr lang="en-GB" sz="1100" b="1">
+                <a:solidFill>
+                  <a:srgbClr val="000000"/>
+                </a:solidFill>
+                <a:latin typeface="Arial" panose="020B0604020202020204" pitchFamily="34" charset="0"/>
+              </a:rPr>
+              <a:t>QuEST_env_localGPU.cu</a:t>
+            </a:r>
+            <a:endParaRPr lang="en-GB" sz="1000" b="1" dirty="0"/>
+          </a:p>
+          <a:p>
+            <a:br>
+              <a:rPr lang="en-GB" sz="1000"/>
+            </a:br>
+            <a:r>
+              <a:rPr lang="en-GB" sz="1000">
+                <a:solidFill>
+                  <a:schemeClr val="accent1"/>
+                </a:solidFill>
+              </a:rPr>
+              <a:t>calcTotalProbability</a:t>
+            </a:r>
+          </a:p>
+          <a:p>
+            <a:r>
+              <a:rPr lang="en-GB" sz="1000">
+                <a:solidFill>
+                  <a:schemeClr val="accent1"/>
+                </a:solidFill>
+              </a:rPr>
+              <a:t>closeQuESTEnv</a:t>
+            </a:r>
+          </a:p>
+          <a:p>
+            <a:r>
+              <a:rPr lang="en-GB" sz="1000">
+                <a:solidFill>
+                  <a:schemeClr val="accent1"/>
+                </a:solidFill>
+              </a:rPr>
+              <a:t>collapseToOutcome</a:t>
+            </a:r>
+          </a:p>
+          <a:p>
+            <a:r>
+              <a:rPr lang="en-GB" sz="1000">
+                <a:solidFill>
+                  <a:schemeClr val="accent1"/>
+                </a:solidFill>
+              </a:rPr>
+              <a:t>compactUnitary</a:t>
+            </a:r>
+          </a:p>
+          <a:p>
+            <a:r>
+              <a:rPr lang="en-GB" sz="1000">
+                <a:solidFill>
+                  <a:schemeClr val="accent1"/>
+                </a:solidFill>
+              </a:rPr>
+              <a:t>controlledCompactUnitary</a:t>
+            </a:r>
+          </a:p>
+          <a:p>
+            <a:r>
+              <a:rPr lang="en-GB" sz="1000">
+                <a:solidFill>
+                  <a:schemeClr val="accent1"/>
+                </a:solidFill>
+              </a:rPr>
+              <a:t>controlledNot</a:t>
+            </a:r>
+          </a:p>
+          <a:p>
+            <a:r>
+              <a:rPr lang="en-GB" sz="1000">
+                <a:solidFill>
+                  <a:schemeClr val="accent1"/>
+                </a:solidFill>
+              </a:rPr>
+              <a:t>controlledPhaseGate</a:t>
+            </a:r>
+          </a:p>
+          <a:p>
+            <a:r>
+              <a:rPr lang="en-GB" sz="1000">
+                <a:solidFill>
+                  <a:schemeClr val="accent1"/>
+                </a:solidFill>
+              </a:rPr>
+              <a:t>controlledUnitary</a:t>
+            </a:r>
+          </a:p>
+          <a:p>
+            <a:r>
+              <a:rPr lang="en-GB" sz="1000">
+                <a:solidFill>
+                  <a:schemeClr val="accent1"/>
+                </a:solidFill>
+              </a:rPr>
+              <a:t>createMultiQubit</a:t>
+            </a:r>
+          </a:p>
+          <a:p>
+            <a:r>
+              <a:rPr lang="en-GB" sz="1000">
+                <a:solidFill>
+                  <a:schemeClr val="accent1"/>
+                </a:solidFill>
+              </a:rPr>
+              <a:t>destroyMultiQubit</a:t>
+            </a:r>
+            <a:endParaRPr lang="en-GB" sz="1000">
+              <a:solidFill>
+                <a:schemeClr val="accent2"/>
+              </a:solidFill>
+            </a:endParaRPr>
+          </a:p>
+          <a:p>
+            <a:r>
+              <a:rPr lang="en-GB" sz="1000">
+                <a:solidFill>
+                  <a:schemeClr val="accent1"/>
+                </a:solidFill>
+              </a:rPr>
+              <a:t>findProbabilityOfOutcome</a:t>
+            </a:r>
+          </a:p>
+          <a:p>
+            <a:r>
+              <a:rPr lang="en-GB" sz="1000">
+                <a:solidFill>
+                  <a:schemeClr val="accent1"/>
+                </a:solidFill>
+              </a:rPr>
+              <a:t>getEnvironmentString</a:t>
+            </a:r>
+          </a:p>
+          <a:p>
+            <a:r>
+              <a:rPr lang="en-GB" sz="1000">
+                <a:solidFill>
+                  <a:schemeClr val="accent1"/>
+                </a:solidFill>
+              </a:rPr>
+              <a:t>getImagAmpEl</a:t>
+            </a:r>
+          </a:p>
+          <a:p>
+            <a:r>
+              <a:rPr lang="en-GB" sz="1000">
+                <a:solidFill>
+                  <a:schemeClr val="accent1"/>
+                </a:solidFill>
+              </a:rPr>
+              <a:t>getRealAmpEl</a:t>
+            </a:r>
+          </a:p>
+          <a:p>
+            <a:r>
+              <a:rPr lang="en-GB" sz="1000">
+                <a:solidFill>
+                  <a:schemeClr val="accent1"/>
+                </a:solidFill>
+              </a:rPr>
+              <a:t>hadamard</a:t>
+            </a:r>
+          </a:p>
+          <a:p>
+            <a:r>
+              <a:rPr lang="en-GB" sz="1000">
+                <a:solidFill>
+                  <a:schemeClr val="accent1"/>
+                </a:solidFill>
+              </a:rPr>
+              <a:t>initClassicalState</a:t>
+            </a:r>
+          </a:p>
+          <a:p>
+            <a:r>
+              <a:rPr lang="en-GB" sz="1000">
+                <a:solidFill>
+                  <a:schemeClr val="accent1"/>
+                </a:solidFill>
+              </a:rPr>
+              <a:t>initQuESTEnv</a:t>
+            </a:r>
+          </a:p>
+          <a:p>
+            <a:r>
+              <a:rPr lang="en-GB" sz="1000">
+                <a:solidFill>
+                  <a:schemeClr val="accent1"/>
+                </a:solidFill>
+              </a:rPr>
+              <a:t>initStatePlus</a:t>
+            </a:r>
+          </a:p>
+          <a:p>
+            <a:r>
+              <a:rPr lang="en-GB" sz="1000">
+                <a:solidFill>
+                  <a:schemeClr val="accent1"/>
+                </a:solidFill>
+              </a:rPr>
+              <a:t>initStateZero</a:t>
+            </a:r>
+          </a:p>
+          <a:p>
+            <a:r>
+              <a:rPr lang="en-GB" sz="1000">
+                <a:solidFill>
+                  <a:schemeClr val="accent1"/>
+                </a:solidFill>
+              </a:rPr>
+              <a:t>measure</a:t>
+            </a:r>
+            <a:endParaRPr lang="en-GB" sz="1000">
+              <a:solidFill>
+                <a:schemeClr val="accent2"/>
+              </a:solidFill>
+            </a:endParaRPr>
+          </a:p>
+          <a:p>
+            <a:r>
+              <a:rPr lang="en-GB" sz="1000">
+                <a:solidFill>
+                  <a:schemeClr val="accent1"/>
+                </a:solidFill>
+              </a:rPr>
+              <a:t>measureWithStats</a:t>
+            </a:r>
+          </a:p>
+          <a:p>
+            <a:r>
+              <a:rPr lang="en-GB" sz="1000">
+                <a:solidFill>
+                  <a:schemeClr val="accent1"/>
+                </a:solidFill>
+              </a:rPr>
+              <a:t>multiControlledPhaseGate</a:t>
+            </a:r>
+          </a:p>
+          <a:p>
+            <a:r>
+              <a:rPr lang="en-GB" sz="1000">
+                <a:solidFill>
+                  <a:schemeClr val="accent1"/>
+                </a:solidFill>
+              </a:rPr>
+              <a:t>multiControlledUnitary</a:t>
+            </a:r>
+          </a:p>
+          <a:p>
+            <a:r>
+              <a:rPr lang="en-GB" sz="1000">
+                <a:solidFill>
+                  <a:schemeClr val="accent1"/>
+                </a:solidFill>
+              </a:rPr>
+              <a:t>reportQuESTEnv</a:t>
+            </a:r>
+          </a:p>
+          <a:p>
+            <a:r>
+              <a:rPr lang="en-GB" sz="1000">
+                <a:solidFill>
+                  <a:schemeClr val="accent1"/>
+                </a:solidFill>
+              </a:rPr>
+              <a:t>reportStateToScreen</a:t>
+            </a:r>
+          </a:p>
+          <a:p>
+            <a:r>
+              <a:rPr lang="en-GB" sz="1000">
+                <a:solidFill>
+                  <a:schemeClr val="accent1"/>
+                </a:solidFill>
+              </a:rPr>
+              <a:t>sigmaX</a:t>
+            </a:r>
+          </a:p>
+          <a:p>
+            <a:r>
+              <a:rPr lang="en-GB" sz="1000">
+                <a:solidFill>
+                  <a:schemeClr val="accent1"/>
+                </a:solidFill>
+              </a:rPr>
+              <a:t>sigmaY</a:t>
+            </a:r>
+          </a:p>
+          <a:p>
+            <a:r>
+              <a:rPr lang="en-GB" sz="1000">
+                <a:solidFill>
+                  <a:schemeClr val="accent1"/>
+                </a:solidFill>
+              </a:rPr>
+              <a:t>syncQuESTEnv</a:t>
+            </a:r>
+          </a:p>
+          <a:p>
+            <a:r>
+              <a:rPr lang="en-GB" sz="1000">
+                <a:solidFill>
+                  <a:schemeClr val="accent1"/>
+                </a:solidFill>
+              </a:rPr>
+              <a:t>syncQuESTSuccess</a:t>
+            </a:r>
+          </a:p>
+          <a:p>
+            <a:r>
+              <a:rPr lang="en-GB" sz="1000">
+                <a:solidFill>
+                  <a:schemeClr val="accent1"/>
+                </a:solidFill>
+              </a:rPr>
+              <a:t>unitary</a:t>
+            </a:r>
+          </a:p>
+          <a:p>
+            <a:endParaRPr lang="en-GB" sz="1000">
+              <a:solidFill>
+                <a:schemeClr val="accent2"/>
+              </a:solidFill>
+            </a:endParaRPr>
+          </a:p>
+          <a:p>
+            <a:r>
+              <a:rPr lang="en-GB" sz="1000">
+                <a:solidFill>
+                  <a:srgbClr val="7030A0"/>
+                </a:solidFill>
+              </a:rPr>
+              <a:t>compareStates</a:t>
+            </a:r>
+          </a:p>
+          <a:p>
+            <a:r>
+              <a:rPr lang="en-GB" sz="1000">
+                <a:solidFill>
+                  <a:srgbClr val="7030A0"/>
+                </a:solidFill>
+              </a:rPr>
+              <a:t>initStateDebug</a:t>
+            </a:r>
+          </a:p>
+          <a:p>
+            <a:r>
+              <a:rPr lang="en-GB" sz="1000">
+                <a:solidFill>
+                  <a:srgbClr val="7030A0"/>
+                </a:solidFill>
+              </a:rPr>
+              <a:t>initStateOfSingleQubit</a:t>
+            </a:r>
+          </a:p>
+          <a:p>
+            <a:r>
+              <a:rPr lang="en-GB" sz="1000">
+                <a:solidFill>
+                  <a:srgbClr val="7030A0"/>
+                </a:solidFill>
+              </a:rPr>
+              <a:t>initializeStateFromSingleFile</a:t>
+            </a:r>
+          </a:p>
+          <a:p>
+            <a:endParaRPr lang="en-GB" sz="1000">
+              <a:solidFill>
+                <a:srgbClr val="7030A0"/>
+              </a:solidFill>
+            </a:endParaRPr>
+          </a:p>
+          <a:p>
+            <a:r>
+              <a:rPr lang="en-GB" sz="1000">
+                <a:solidFill>
+                  <a:srgbClr val="C00000"/>
+                </a:solidFill>
+              </a:rPr>
+              <a:t>extractBit</a:t>
+            </a:r>
+            <a:endParaRPr lang="en-GB" sz="1000">
+              <a:solidFill>
+                <a:srgbClr val="7030A0"/>
+              </a:solidFill>
+            </a:endParaRPr>
+          </a:p>
+          <a:p>
+            <a:endParaRPr lang="en-GB" sz="1000">
+              <a:solidFill>
+                <a:srgbClr val="7030A0"/>
+              </a:solidFill>
+            </a:endParaRPr>
+          </a:p>
+          <a:p>
+            <a:r>
+              <a:rPr lang="en-GB" sz="1000"/>
+              <a:t>GPUExists</a:t>
+            </a:r>
+          </a:p>
+          <a:p>
+            <a:r>
+              <a:rPr lang="en-GB" sz="1000"/>
+              <a:t>collapseToOutcomeKernel</a:t>
+            </a:r>
+          </a:p>
+          <a:p>
+            <a:r>
+              <a:rPr lang="en-GB" sz="1000"/>
+              <a:t>compactUnitaryKernel</a:t>
+            </a:r>
+          </a:p>
+          <a:p>
+            <a:r>
+              <a:rPr lang="en-GB" sz="1000"/>
+              <a:t>controlledCompactUnitaryKernel</a:t>
+            </a:r>
+          </a:p>
+          <a:p>
+            <a:r>
+              <a:rPr lang="en-GB" sz="1000"/>
+              <a:t>controlledNotKernel</a:t>
+            </a:r>
+          </a:p>
+          <a:p>
+            <a:r>
+              <a:rPr lang="en-GB" sz="1000"/>
+              <a:t>controlledPhaseGateKernel</a:t>
+            </a:r>
+          </a:p>
+          <a:p>
+            <a:r>
+              <a:rPr lang="en-GB" sz="1000"/>
+              <a:t>controlledUnitaryKernel</a:t>
+            </a:r>
+          </a:p>
+          <a:p>
+            <a:r>
+              <a:rPr lang="en-GB" sz="1000"/>
+              <a:t>copySharedReduceBlock</a:t>
+            </a:r>
+          </a:p>
+          <a:p>
+            <a:r>
+              <a:rPr lang="en-GB" sz="1000"/>
+              <a:t>copyStateFromGPU</a:t>
+            </a:r>
+          </a:p>
+          <a:p>
+            <a:r>
+              <a:rPr lang="en-GB" sz="1000"/>
+              <a:t>copyStateToGPU</a:t>
+            </a:r>
+          </a:p>
+          <a:p>
+            <a:r>
+              <a:rPr lang="en-GB" sz="1000"/>
+              <a:t>findProbabilityOfZeroKernel</a:t>
+            </a:r>
+          </a:p>
+          <a:p>
+            <a:r>
+              <a:rPr lang="en-GB" sz="1000"/>
+              <a:t>getNumReductionLevels</a:t>
+            </a:r>
+          </a:p>
+          <a:p>
+            <a:r>
+              <a:rPr lang="en-GB" sz="1000"/>
+              <a:t>hadamardKernel</a:t>
+            </a:r>
+          </a:p>
+          <a:p>
+            <a:r>
+              <a:rPr lang="en-GB" sz="1000"/>
+              <a:t>initClassicalStateKernel</a:t>
+            </a:r>
+          </a:p>
+          <a:p>
+            <a:r>
+              <a:rPr lang="en-GB" sz="1000"/>
+              <a:t>initStateDebugKernel</a:t>
+            </a:r>
+          </a:p>
+          <a:p>
+            <a:r>
+              <a:rPr lang="en-GB" sz="1000"/>
+              <a:t>initStateOfSingleQubitKernel</a:t>
+            </a:r>
+          </a:p>
+          <a:p>
+            <a:r>
+              <a:rPr lang="en-GB" sz="1000"/>
+              <a:t>initStatePlusKernel</a:t>
+            </a:r>
+          </a:p>
+          <a:p>
+            <a:r>
+              <a:rPr lang="en-GB" sz="1000"/>
+              <a:t>initStateZeroKernel</a:t>
+            </a:r>
+          </a:p>
+          <a:p>
+            <a:r>
+              <a:rPr lang="en-GB" sz="1000"/>
+              <a:t>log2Int</a:t>
+            </a:r>
+          </a:p>
+          <a:p>
+            <a:r>
+              <a:rPr lang="en-GB" sz="1000"/>
+              <a:t>measureInZeroKernel</a:t>
+            </a:r>
+          </a:p>
+          <a:p>
+            <a:r>
+              <a:rPr lang="en-GB" sz="1000"/>
+              <a:t>multiControlledPhaseGateKernel</a:t>
+            </a:r>
+          </a:p>
+          <a:p>
+            <a:r>
+              <a:rPr lang="en-GB" sz="1000"/>
+              <a:t>multiControlledUnitaryKernel</a:t>
+            </a:r>
+          </a:p>
+          <a:p>
+            <a:r>
+              <a:rPr lang="en-GB" sz="1000"/>
+              <a:t>phaseGateKernel</a:t>
+            </a:r>
+          </a:p>
+          <a:p>
+            <a:r>
+              <a:rPr lang="en-GB" sz="1000"/>
+              <a:t>reduceBlock</a:t>
+            </a:r>
+          </a:p>
+          <a:p>
+            <a:r>
+              <a:rPr lang="en-GB" sz="1000"/>
+              <a:t>sigmaXKernel</a:t>
+            </a:r>
+          </a:p>
+          <a:p>
+            <a:r>
+              <a:rPr lang="en-GB" sz="1000"/>
+              <a:t>sigmaYKernel</a:t>
+            </a:r>
+          </a:p>
+          <a:p>
+            <a:r>
+              <a:rPr lang="en-GB" sz="1000"/>
+              <a:t>swapDouble</a:t>
+            </a:r>
+          </a:p>
+          <a:p>
+            <a:r>
+              <a:rPr lang="en-GB" sz="1000"/>
+              <a:t>unitaryKernel</a:t>
+            </a:r>
+          </a:p>
+        </p:txBody>
+      </p:sp>
+      <p:sp>
+        <p:nvSpPr>
+          <p:cNvPr id="9" name="Rectangle 8">
+            <a:extLst>
+              <a:ext uri="{FF2B5EF4-FFF2-40B4-BE49-F238E27FC236}">
+                <a16:creationId xmlns:a16="http://schemas.microsoft.com/office/drawing/2014/main" id="{36FF27BA-F947-454F-B6C0-43C74D81ED6F}"/>
+              </a:ext>
+            </a:extLst>
+          </p:cNvPr>
+          <p:cNvSpPr/>
+          <p:nvPr/>
+        </p:nvSpPr>
+        <p:spPr>
+          <a:xfrm>
+            <a:off x="9936118" y="388595"/>
+            <a:ext cx="2310063" cy="7186583"/>
+          </a:xfrm>
+          <a:prstGeom prst="rect">
+            <a:avLst/>
+          </a:prstGeom>
+          <a:ln>
+            <a:solidFill>
+              <a:schemeClr val="tx1"/>
+            </a:solidFill>
+          </a:ln>
+        </p:spPr>
+        <p:txBody>
+          <a:bodyPr wrap="square">
+            <a:spAutoFit/>
+          </a:bodyPr>
+          <a:lstStyle/>
+          <a:p>
+            <a:pPr algn="ctr"/>
+            <a:r>
+              <a:rPr lang="en-GB" sz="1100" b="1" err="1">
+                <a:solidFill>
+                  <a:srgbClr val="000000"/>
+                </a:solidFill>
+                <a:latin typeface="Arial" panose="020B0604020202020204" pitchFamily="34" charset="0"/>
+              </a:rPr>
+              <a:t>QuEST</a:t>
+            </a:r>
+            <a:r>
+              <a:rPr lang="en-GB" sz="1100" b="1">
+                <a:solidFill>
+                  <a:srgbClr val="000000"/>
+                </a:solidFill>
+                <a:latin typeface="Arial" panose="020B0604020202020204" pitchFamily="34" charset="0"/>
+              </a:rPr>
+              <a:t>.c</a:t>
+            </a:r>
+            <a:endParaRPr lang="en-GB" sz="1000" b="1" dirty="0"/>
+          </a:p>
+          <a:p>
+            <a:br>
+              <a:rPr lang="en-GB" sz="1000"/>
+            </a:br>
+            <a:r>
+              <a:rPr lang="en-GB" sz="1000">
+                <a:solidFill>
+                  <a:srgbClr val="FF0000"/>
+                </a:solidFill>
+              </a:rPr>
+              <a:t>controlledPhaseGate</a:t>
+            </a:r>
+          </a:p>
+          <a:p>
+            <a:r>
+              <a:rPr lang="en-GB" sz="1000">
+                <a:solidFill>
+                  <a:schemeClr val="accent1"/>
+                </a:solidFill>
+              </a:rPr>
+              <a:t>createMultiQubit</a:t>
+            </a:r>
+          </a:p>
+          <a:p>
+            <a:r>
+              <a:rPr lang="en-GB" sz="1000">
+                <a:solidFill>
+                  <a:schemeClr val="accent1"/>
+                </a:solidFill>
+              </a:rPr>
+              <a:t>destroyMultiQubit</a:t>
+            </a:r>
+          </a:p>
+          <a:p>
+            <a:r>
+              <a:rPr lang="en-GB" sz="1000">
+                <a:solidFill>
+                  <a:schemeClr val="accent1"/>
+                </a:solidFill>
+              </a:rPr>
+              <a:t>getEnvironmentString</a:t>
+            </a:r>
+          </a:p>
+          <a:p>
+            <a:r>
+              <a:rPr lang="en-GB" sz="1000">
+                <a:solidFill>
+                  <a:schemeClr val="accent1"/>
+                </a:solidFill>
+              </a:rPr>
+              <a:t>initClassicalState</a:t>
+            </a:r>
+          </a:p>
+          <a:p>
+            <a:r>
+              <a:rPr lang="en-GB" sz="1000">
+                <a:solidFill>
+                  <a:schemeClr val="accent1"/>
+                </a:solidFill>
+              </a:rPr>
+              <a:t>initStatePlus</a:t>
+            </a:r>
+          </a:p>
+          <a:p>
+            <a:r>
+              <a:rPr lang="en-GB" sz="1000">
+                <a:solidFill>
+                  <a:schemeClr val="accent1"/>
+                </a:solidFill>
+              </a:rPr>
+              <a:t>initStateZero</a:t>
+            </a:r>
+          </a:p>
+          <a:p>
+            <a:r>
+              <a:rPr lang="en-GB" sz="1000">
+                <a:solidFill>
+                  <a:schemeClr val="accent1"/>
+                </a:solidFill>
+              </a:rPr>
+              <a:t>multiControlledPhaseGate</a:t>
+            </a:r>
+          </a:p>
+          <a:p>
+            <a:r>
+              <a:rPr lang="en-GB" sz="1000">
+                <a:solidFill>
+                  <a:schemeClr val="accent1"/>
+                </a:solidFill>
+              </a:rPr>
+              <a:t>reportStateToScreen</a:t>
+            </a:r>
+          </a:p>
+          <a:p>
+            <a:endParaRPr lang="en-GB" sz="1000">
+              <a:solidFill>
+                <a:schemeClr val="accent2"/>
+              </a:solidFill>
+            </a:endParaRPr>
+          </a:p>
+          <a:p>
+            <a:r>
+              <a:rPr lang="en-GB" sz="1000">
+                <a:solidFill>
+                  <a:schemeClr val="accent2"/>
+                </a:solidFill>
+              </a:rPr>
+              <a:t>collapseToOutcomeDistributedRenorm</a:t>
+            </a:r>
+          </a:p>
+          <a:p>
+            <a:r>
+              <a:rPr lang="en-GB" sz="1000">
+                <a:solidFill>
+                  <a:schemeClr val="accent2"/>
+                </a:solidFill>
+              </a:rPr>
+              <a:t>collapseToOutcomeDistributedSetZero</a:t>
+            </a:r>
+          </a:p>
+          <a:p>
+            <a:r>
+              <a:rPr lang="en-GB" sz="1000">
+                <a:solidFill>
+                  <a:schemeClr val="accent2"/>
+                </a:solidFill>
+              </a:rPr>
+              <a:t>collapseToOutcomeLocal</a:t>
+            </a:r>
+          </a:p>
+          <a:p>
+            <a:r>
+              <a:rPr lang="en-GB" sz="1000">
+                <a:solidFill>
+                  <a:schemeClr val="accent2"/>
+                </a:solidFill>
+              </a:rPr>
+              <a:t>compactUnitaryDistributed</a:t>
+            </a:r>
+          </a:p>
+          <a:p>
+            <a:r>
+              <a:rPr lang="en-GB" sz="1000">
+                <a:solidFill>
+                  <a:schemeClr val="accent2"/>
+                </a:solidFill>
+              </a:rPr>
+              <a:t>compactUnitaryLocal</a:t>
+            </a:r>
+          </a:p>
+          <a:p>
+            <a:r>
+              <a:rPr lang="en-GB" sz="1000">
+                <a:solidFill>
+                  <a:schemeClr val="accent2"/>
+                </a:solidFill>
+              </a:rPr>
+              <a:t>controlledCompactUnitaryDistributed</a:t>
+            </a:r>
+          </a:p>
+          <a:p>
+            <a:r>
+              <a:rPr lang="en-GB" sz="1000">
+                <a:solidFill>
+                  <a:schemeClr val="accent2"/>
+                </a:solidFill>
+              </a:rPr>
+              <a:t>controlledCompactUnitaryLocal</a:t>
+            </a:r>
+          </a:p>
+          <a:p>
+            <a:r>
+              <a:rPr lang="en-GB" sz="1000">
+                <a:solidFill>
+                  <a:schemeClr val="accent2"/>
+                </a:solidFill>
+              </a:rPr>
+              <a:t>controlledNotDistributed</a:t>
+            </a:r>
+          </a:p>
+          <a:p>
+            <a:r>
+              <a:rPr lang="en-GB" sz="1000">
+                <a:solidFill>
+                  <a:schemeClr val="accent2"/>
+                </a:solidFill>
+              </a:rPr>
+              <a:t>controlledNotLocal</a:t>
+            </a:r>
+          </a:p>
+          <a:p>
+            <a:r>
+              <a:rPr lang="en-GB" sz="1000">
+                <a:solidFill>
+                  <a:schemeClr val="accent2"/>
+                </a:solidFill>
+              </a:rPr>
+              <a:t>controlledUnitaryDistributed</a:t>
+            </a:r>
+          </a:p>
+          <a:p>
+            <a:r>
+              <a:rPr lang="en-GB" sz="1000">
+                <a:solidFill>
+                  <a:schemeClr val="accent2"/>
+                </a:solidFill>
+              </a:rPr>
+              <a:t>controlledUnitaryLocal</a:t>
+            </a:r>
+          </a:p>
+          <a:p>
+            <a:r>
+              <a:rPr lang="en-GB" sz="1000">
+                <a:solidFill>
+                  <a:schemeClr val="accent2"/>
+                </a:solidFill>
+              </a:rPr>
+              <a:t>findProbabilityOfZeroDistributed</a:t>
+            </a:r>
+          </a:p>
+          <a:p>
+            <a:r>
+              <a:rPr lang="en-GB" sz="1000">
+                <a:solidFill>
+                  <a:schemeClr val="accent2"/>
+                </a:solidFill>
+              </a:rPr>
+              <a:t>findProbabilityOfZeroLocal</a:t>
+            </a:r>
+          </a:p>
+          <a:p>
+            <a:r>
+              <a:rPr lang="en-GB" sz="1000">
+                <a:solidFill>
+                  <a:schemeClr val="accent2"/>
+                </a:solidFill>
+              </a:rPr>
+              <a:t>hadamardDistributed</a:t>
+            </a:r>
+          </a:p>
+          <a:p>
+            <a:r>
+              <a:rPr lang="en-GB" sz="1000">
+                <a:solidFill>
+                  <a:schemeClr val="accent2"/>
+                </a:solidFill>
+              </a:rPr>
+              <a:t>hadamardLocal</a:t>
+            </a:r>
+          </a:p>
+          <a:p>
+            <a:r>
+              <a:rPr lang="en-GB" sz="1000">
+                <a:solidFill>
+                  <a:schemeClr val="accent2"/>
+                </a:solidFill>
+              </a:rPr>
+              <a:t>multiControlledUnitaryDistributed</a:t>
+            </a:r>
+          </a:p>
+          <a:p>
+            <a:r>
+              <a:rPr lang="en-GB" sz="1000">
+                <a:solidFill>
+                  <a:schemeClr val="accent2"/>
+                </a:solidFill>
+              </a:rPr>
+              <a:t>multiControlledUnitaryLocal</a:t>
+            </a:r>
+          </a:p>
+          <a:p>
+            <a:r>
+              <a:rPr lang="en-GB" sz="1000">
+                <a:solidFill>
+                  <a:schemeClr val="accent2"/>
+                </a:solidFill>
+              </a:rPr>
+              <a:t>phaseGateDistributed</a:t>
+            </a:r>
+          </a:p>
+          <a:p>
+            <a:r>
+              <a:rPr lang="en-GB" sz="1000">
+                <a:solidFill>
+                  <a:schemeClr val="accent2"/>
+                </a:solidFill>
+              </a:rPr>
+              <a:t>phaseGateLocal</a:t>
+            </a:r>
+          </a:p>
+          <a:p>
+            <a:r>
+              <a:rPr lang="en-GB" sz="1000">
+                <a:solidFill>
+                  <a:schemeClr val="accent2"/>
+                </a:solidFill>
+              </a:rPr>
+              <a:t>sigmaXDistributed</a:t>
+            </a:r>
+          </a:p>
+          <a:p>
+            <a:r>
+              <a:rPr lang="en-GB" sz="1000">
+                <a:solidFill>
+                  <a:schemeClr val="accent2"/>
+                </a:solidFill>
+              </a:rPr>
+              <a:t>sigmaXLocal</a:t>
+            </a:r>
+          </a:p>
+          <a:p>
+            <a:r>
+              <a:rPr lang="en-GB" sz="1000">
+                <a:solidFill>
+                  <a:schemeClr val="accent2"/>
+                </a:solidFill>
+              </a:rPr>
+              <a:t>sigmaYDistributed</a:t>
+            </a:r>
+          </a:p>
+          <a:p>
+            <a:r>
+              <a:rPr lang="en-GB" sz="1000">
+                <a:solidFill>
+                  <a:schemeClr val="accent2"/>
+                </a:solidFill>
+              </a:rPr>
+              <a:t>sigmaYLocal</a:t>
+            </a:r>
+          </a:p>
+          <a:p>
+            <a:r>
+              <a:rPr lang="en-GB" sz="1000">
+                <a:solidFill>
+                  <a:schemeClr val="accent2"/>
+                </a:solidFill>
+              </a:rPr>
+              <a:t>unitaryDistributed</a:t>
+            </a:r>
+          </a:p>
+          <a:p>
+            <a:r>
+              <a:rPr lang="en-GB" sz="1000">
+                <a:solidFill>
+                  <a:schemeClr val="accent2"/>
+                </a:solidFill>
+              </a:rPr>
+              <a:t>unitaryLocal</a:t>
+            </a:r>
+          </a:p>
+          <a:p>
+            <a:endParaRPr lang="en-GB" sz="1000">
+              <a:solidFill>
+                <a:schemeClr val="accent2"/>
+              </a:solidFill>
+            </a:endParaRPr>
+          </a:p>
+          <a:p>
+            <a:r>
+              <a:rPr lang="en-GB" sz="1000">
+                <a:solidFill>
+                  <a:srgbClr val="7030A0"/>
+                </a:solidFill>
+              </a:rPr>
+              <a:t>compareStates</a:t>
+            </a:r>
+          </a:p>
+          <a:p>
+            <a:r>
+              <a:rPr lang="en-GB" sz="1000">
+                <a:solidFill>
+                  <a:srgbClr val="7030A0"/>
+                </a:solidFill>
+              </a:rPr>
+              <a:t>initStateDebug</a:t>
+            </a:r>
+          </a:p>
+          <a:p>
+            <a:r>
+              <a:rPr lang="en-GB" sz="1000">
+                <a:solidFill>
+                  <a:srgbClr val="7030A0"/>
+                </a:solidFill>
+              </a:rPr>
+              <a:t>initStateOfSingleQubit</a:t>
+            </a:r>
+          </a:p>
+          <a:p>
+            <a:r>
+              <a:rPr lang="en-GB" sz="1000">
+                <a:solidFill>
+                  <a:srgbClr val="7030A0"/>
+                </a:solidFill>
+              </a:rPr>
+              <a:t>initializeStateFromSingleFile</a:t>
+            </a:r>
+          </a:p>
+          <a:p>
+            <a:endParaRPr lang="en-GB" sz="1000">
+              <a:solidFill>
+                <a:srgbClr val="7030A0"/>
+              </a:solidFill>
+            </a:endParaRPr>
+          </a:p>
+          <a:p>
+            <a:r>
+              <a:rPr lang="en-GB" sz="1000">
+                <a:solidFill>
+                  <a:srgbClr val="C00000"/>
+                </a:solidFill>
+              </a:rPr>
+              <a:t>extractBit</a:t>
+            </a:r>
+            <a:endParaRPr lang="en-GB" sz="1000">
+              <a:solidFill>
+                <a:schemeClr val="accent2"/>
+              </a:solidFill>
+            </a:endParaRPr>
+          </a:p>
+          <a:p>
+            <a:pPr algn="ctr"/>
+            <a:r>
+              <a:rPr lang="en-GB" sz="1000" b="1"/>
+              <a:t>Prototyped:</a:t>
+            </a:r>
+            <a:endParaRPr lang="en-GB" sz="1000">
+              <a:solidFill>
+                <a:schemeClr val="accent2"/>
+              </a:solidFill>
+            </a:endParaRPr>
+          </a:p>
+          <a:p>
+            <a:r>
+              <a:rPr lang="en-GB" sz="1000">
+                <a:solidFill>
+                  <a:srgbClr val="C00000"/>
+                </a:solidFill>
+              </a:rPr>
+              <a:t>extractBit</a:t>
+            </a:r>
+          </a:p>
+        </p:txBody>
+      </p:sp>
+      <p:sp>
+        <p:nvSpPr>
+          <p:cNvPr id="10" name="Rectangle 9">
+            <a:extLst>
+              <a:ext uri="{FF2B5EF4-FFF2-40B4-BE49-F238E27FC236}">
+                <a16:creationId xmlns:a16="http://schemas.microsoft.com/office/drawing/2014/main" id="{FF5B39A7-A615-DF4C-9DB7-4B55E4BA087D}"/>
+              </a:ext>
+            </a:extLst>
+          </p:cNvPr>
+          <p:cNvSpPr/>
+          <p:nvPr/>
+        </p:nvSpPr>
+        <p:spPr>
+          <a:xfrm>
+            <a:off x="17299822" y="396618"/>
+            <a:ext cx="2310063" cy="4416594"/>
+          </a:xfrm>
+          <a:prstGeom prst="rect">
+            <a:avLst/>
+          </a:prstGeom>
+          <a:ln w="38100">
+            <a:solidFill>
+              <a:schemeClr val="accent2"/>
+            </a:solidFill>
+          </a:ln>
+        </p:spPr>
+        <p:txBody>
+          <a:bodyPr wrap="square">
+            <a:spAutoFit/>
+          </a:bodyPr>
+          <a:lstStyle/>
+          <a:p>
+            <a:pPr algn="ctr"/>
+            <a:r>
+              <a:rPr lang="en-GB" sz="1100" b="1">
+                <a:solidFill>
+                  <a:srgbClr val="000000"/>
+                </a:solidFill>
+                <a:latin typeface="Arial" panose="020B0604020202020204" pitchFamily="34" charset="0"/>
+              </a:rPr>
+              <a:t>QuEST_internal.h</a:t>
+            </a:r>
+            <a:endParaRPr lang="en-GB" sz="1000" b="1" dirty="0"/>
+          </a:p>
+          <a:p>
+            <a:br>
+              <a:rPr lang="en-GB" sz="1000"/>
+            </a:br>
+            <a:r>
+              <a:rPr lang="en-GB" sz="1000">
+                <a:solidFill>
+                  <a:schemeClr val="accent2"/>
+                </a:solidFill>
+              </a:rPr>
+              <a:t>collapseToOutcomeDistributedRenorm</a:t>
+            </a:r>
+          </a:p>
+          <a:p>
+            <a:r>
+              <a:rPr lang="en-GB" sz="1000">
+                <a:solidFill>
+                  <a:schemeClr val="accent2"/>
+                </a:solidFill>
+              </a:rPr>
+              <a:t>collapseToOutcomeDistributedSetZero</a:t>
+            </a:r>
+          </a:p>
+          <a:p>
+            <a:r>
+              <a:rPr lang="en-GB" sz="1000">
+                <a:solidFill>
+                  <a:schemeClr val="accent2"/>
+                </a:solidFill>
+              </a:rPr>
+              <a:t>collapseToOutcomeLocal</a:t>
+            </a:r>
+          </a:p>
+          <a:p>
+            <a:r>
+              <a:rPr lang="en-GB" sz="1000">
+                <a:solidFill>
+                  <a:schemeClr val="accent2"/>
+                </a:solidFill>
+              </a:rPr>
+              <a:t>compactUnitaryDistributed</a:t>
+            </a:r>
+          </a:p>
+          <a:p>
+            <a:r>
+              <a:rPr lang="en-GB" sz="1000">
+                <a:solidFill>
+                  <a:schemeClr val="accent2"/>
+                </a:solidFill>
+              </a:rPr>
+              <a:t>compactUnitaryLocal</a:t>
+            </a:r>
+          </a:p>
+          <a:p>
+            <a:r>
+              <a:rPr lang="en-GB" sz="1000">
+                <a:solidFill>
+                  <a:schemeClr val="accent2"/>
+                </a:solidFill>
+              </a:rPr>
+              <a:t>controlledCompactUnitaryDistributed</a:t>
+            </a:r>
+          </a:p>
+          <a:p>
+            <a:r>
+              <a:rPr lang="en-GB" sz="1000">
+                <a:solidFill>
+                  <a:schemeClr val="accent2"/>
+                </a:solidFill>
+              </a:rPr>
+              <a:t>controlledCompactUnitaryLocal</a:t>
+            </a:r>
+          </a:p>
+          <a:p>
+            <a:r>
+              <a:rPr lang="en-GB" sz="1000">
+                <a:solidFill>
+                  <a:schemeClr val="accent2"/>
+                </a:solidFill>
+              </a:rPr>
+              <a:t>controlledNotDistributed</a:t>
+            </a:r>
+          </a:p>
+          <a:p>
+            <a:r>
+              <a:rPr lang="en-GB" sz="1000">
+                <a:solidFill>
+                  <a:schemeClr val="accent2"/>
+                </a:solidFill>
+              </a:rPr>
+              <a:t>controlledNotLocal</a:t>
+            </a:r>
+          </a:p>
+          <a:p>
+            <a:r>
+              <a:rPr lang="en-GB" sz="1000">
+                <a:solidFill>
+                  <a:schemeClr val="accent2"/>
+                </a:solidFill>
+              </a:rPr>
+              <a:t>controlledUnitaryDistributed</a:t>
+            </a:r>
+          </a:p>
+          <a:p>
+            <a:r>
+              <a:rPr lang="en-GB" sz="1000">
+                <a:solidFill>
+                  <a:schemeClr val="accent2"/>
+                </a:solidFill>
+              </a:rPr>
+              <a:t>controlledUnitaryLocal</a:t>
+            </a:r>
+          </a:p>
+          <a:p>
+            <a:r>
+              <a:rPr lang="en-GB" sz="1000">
+                <a:solidFill>
+                  <a:schemeClr val="accent2"/>
+                </a:solidFill>
+              </a:rPr>
+              <a:t>findProbabilityOfZeroDistributed</a:t>
+            </a:r>
+          </a:p>
+          <a:p>
+            <a:r>
+              <a:rPr lang="en-GB" sz="1000">
+                <a:solidFill>
+                  <a:schemeClr val="accent2"/>
+                </a:solidFill>
+              </a:rPr>
+              <a:t>findProbabilityOfZeroLocal</a:t>
+            </a:r>
+          </a:p>
+          <a:p>
+            <a:r>
+              <a:rPr lang="en-GB" sz="1000">
+                <a:solidFill>
+                  <a:schemeClr val="accent2"/>
+                </a:solidFill>
+              </a:rPr>
+              <a:t>hadamardDistributed</a:t>
+            </a:r>
+          </a:p>
+          <a:p>
+            <a:r>
+              <a:rPr lang="en-GB" sz="1000">
+                <a:solidFill>
+                  <a:schemeClr val="accent2"/>
+                </a:solidFill>
+              </a:rPr>
+              <a:t>hadamardLocal</a:t>
+            </a:r>
+          </a:p>
+          <a:p>
+            <a:r>
+              <a:rPr lang="en-GB" sz="1000">
+                <a:solidFill>
+                  <a:schemeClr val="accent2"/>
+                </a:solidFill>
+              </a:rPr>
+              <a:t>multiControlledUnitaryDistributed</a:t>
+            </a:r>
+          </a:p>
+          <a:p>
+            <a:r>
+              <a:rPr lang="en-GB" sz="1000">
+                <a:solidFill>
+                  <a:schemeClr val="accent2"/>
+                </a:solidFill>
+              </a:rPr>
+              <a:t>multiControlledUnitaryLocal</a:t>
+            </a:r>
+          </a:p>
+          <a:p>
+            <a:r>
+              <a:rPr lang="en-GB" sz="1000">
+                <a:solidFill>
+                  <a:schemeClr val="accent2"/>
+                </a:solidFill>
+              </a:rPr>
+              <a:t>phaseGateDistributed</a:t>
+            </a:r>
+          </a:p>
+          <a:p>
+            <a:r>
+              <a:rPr lang="en-GB" sz="1000">
+                <a:solidFill>
+                  <a:schemeClr val="accent2"/>
+                </a:solidFill>
+              </a:rPr>
+              <a:t>phaseGateLocal</a:t>
+            </a:r>
+          </a:p>
+          <a:p>
+            <a:r>
+              <a:rPr lang="en-GB" sz="1000">
+                <a:solidFill>
+                  <a:schemeClr val="accent2"/>
+                </a:solidFill>
+              </a:rPr>
+              <a:t>sigmaXDistributed</a:t>
+            </a:r>
+          </a:p>
+          <a:p>
+            <a:r>
+              <a:rPr lang="en-GB" sz="1000">
+                <a:solidFill>
+                  <a:schemeClr val="accent2"/>
+                </a:solidFill>
+              </a:rPr>
+              <a:t>sigmaXLocal</a:t>
+            </a:r>
+          </a:p>
+          <a:p>
+            <a:r>
+              <a:rPr lang="en-GB" sz="1000">
+                <a:solidFill>
+                  <a:schemeClr val="accent2"/>
+                </a:solidFill>
+              </a:rPr>
+              <a:t>sigmaYDistributed</a:t>
+            </a:r>
+          </a:p>
+          <a:p>
+            <a:r>
+              <a:rPr lang="en-GB" sz="1000">
+                <a:solidFill>
+                  <a:schemeClr val="accent2"/>
+                </a:solidFill>
+              </a:rPr>
+              <a:t>sigmaYLocal</a:t>
+            </a:r>
+          </a:p>
+          <a:p>
+            <a:r>
+              <a:rPr lang="en-GB" sz="1000">
+                <a:solidFill>
+                  <a:schemeClr val="accent2"/>
+                </a:solidFill>
+              </a:rPr>
+              <a:t>unitaryDistributed</a:t>
+            </a:r>
+          </a:p>
+          <a:p>
+            <a:r>
+              <a:rPr lang="en-GB" sz="1000">
+                <a:solidFill>
+                  <a:schemeClr val="accent2"/>
+                </a:solidFill>
+              </a:rPr>
+              <a:t>unitaryLocal</a:t>
+            </a:r>
+          </a:p>
+        </p:txBody>
+      </p:sp>
+      <p:sp>
+        <p:nvSpPr>
+          <p:cNvPr id="11" name="Rectangle 10">
+            <a:extLst>
+              <a:ext uri="{FF2B5EF4-FFF2-40B4-BE49-F238E27FC236}">
+                <a16:creationId xmlns:a16="http://schemas.microsoft.com/office/drawing/2014/main" id="{8C64909B-66D5-504B-85B8-D151C4EFE36F}"/>
+              </a:ext>
+            </a:extLst>
+          </p:cNvPr>
+          <p:cNvSpPr/>
+          <p:nvPr/>
+        </p:nvSpPr>
+        <p:spPr>
+          <a:xfrm>
+            <a:off x="12382540" y="412659"/>
+            <a:ext cx="2310063" cy="4262705"/>
+          </a:xfrm>
+          <a:prstGeom prst="rect">
+            <a:avLst/>
+          </a:prstGeom>
+          <a:ln>
+            <a:solidFill>
+              <a:schemeClr val="tx1"/>
+            </a:solidFill>
+          </a:ln>
+        </p:spPr>
+        <p:txBody>
+          <a:bodyPr wrap="square">
+            <a:spAutoFit/>
+          </a:bodyPr>
+          <a:lstStyle/>
+          <a:p>
+            <a:pPr algn="ctr"/>
+            <a:r>
+              <a:rPr lang="en-GB" sz="1100" b="1">
+                <a:solidFill>
+                  <a:srgbClr val="000000"/>
+                </a:solidFill>
+                <a:latin typeface="Arial" panose="020B0604020202020204" pitchFamily="34" charset="0"/>
+              </a:rPr>
+              <a:t>QuEST_env_local.c</a:t>
+            </a:r>
+            <a:endParaRPr lang="en-GB" sz="1000" b="1" dirty="0"/>
+          </a:p>
+          <a:p>
+            <a:br>
+              <a:rPr lang="en-GB" sz="1000"/>
+            </a:br>
+            <a:r>
+              <a:rPr lang="en-GB" sz="1000">
+                <a:solidFill>
+                  <a:schemeClr val="accent1"/>
+                </a:solidFill>
+              </a:rPr>
+              <a:t>calcTotalProbability</a:t>
+            </a:r>
+          </a:p>
+          <a:p>
+            <a:r>
+              <a:rPr lang="en-GB" sz="1000">
+                <a:solidFill>
+                  <a:schemeClr val="accent1"/>
+                </a:solidFill>
+              </a:rPr>
+              <a:t>closeQuESTEnv</a:t>
+            </a:r>
+          </a:p>
+          <a:p>
+            <a:r>
+              <a:rPr lang="en-GB" sz="1000">
+                <a:solidFill>
+                  <a:schemeClr val="accent1"/>
+                </a:solidFill>
+              </a:rPr>
+              <a:t>collapseToOutcome</a:t>
+            </a:r>
+          </a:p>
+          <a:p>
+            <a:r>
+              <a:rPr lang="en-GB" sz="1000">
+                <a:solidFill>
+                  <a:schemeClr val="accent1"/>
+                </a:solidFill>
+              </a:rPr>
+              <a:t>compactUnitary</a:t>
+            </a:r>
+          </a:p>
+          <a:p>
+            <a:r>
+              <a:rPr lang="en-GB" sz="1000">
+                <a:solidFill>
+                  <a:schemeClr val="accent1"/>
+                </a:solidFill>
+              </a:rPr>
+              <a:t>controlledCompactUnitary</a:t>
+            </a:r>
+          </a:p>
+          <a:p>
+            <a:r>
+              <a:rPr lang="en-GB" sz="1000">
+                <a:solidFill>
+                  <a:schemeClr val="accent1"/>
+                </a:solidFill>
+              </a:rPr>
+              <a:t>controlledNot</a:t>
+            </a:r>
+          </a:p>
+          <a:p>
+            <a:r>
+              <a:rPr lang="en-GB" sz="1000">
+                <a:solidFill>
+                  <a:schemeClr val="accent1"/>
+                </a:solidFill>
+              </a:rPr>
+              <a:t>controlledUnitary</a:t>
+            </a:r>
+          </a:p>
+          <a:p>
+            <a:r>
+              <a:rPr lang="en-GB" sz="1000">
+                <a:solidFill>
+                  <a:schemeClr val="accent1"/>
+                </a:solidFill>
+              </a:rPr>
+              <a:t>findProbabilityOfOutcome</a:t>
+            </a:r>
+          </a:p>
+          <a:p>
+            <a:r>
+              <a:rPr lang="en-GB" sz="1000">
+                <a:solidFill>
+                  <a:schemeClr val="accent1"/>
+                </a:solidFill>
+              </a:rPr>
+              <a:t>getImagAmpEl</a:t>
+            </a:r>
+          </a:p>
+          <a:p>
+            <a:r>
+              <a:rPr lang="en-GB" sz="1000">
+                <a:solidFill>
+                  <a:schemeClr val="accent1"/>
+                </a:solidFill>
+              </a:rPr>
+              <a:t>getRealAmpEl</a:t>
+            </a:r>
+          </a:p>
+          <a:p>
+            <a:r>
+              <a:rPr lang="en-GB" sz="1000">
+                <a:solidFill>
+                  <a:schemeClr val="accent1"/>
+                </a:solidFill>
+              </a:rPr>
+              <a:t>hadamard</a:t>
+            </a:r>
+          </a:p>
+          <a:p>
+            <a:r>
+              <a:rPr lang="en-GB" sz="1000">
+                <a:solidFill>
+                  <a:schemeClr val="accent1"/>
+                </a:solidFill>
+              </a:rPr>
+              <a:t>initQuESTEnv</a:t>
+            </a:r>
+          </a:p>
+          <a:p>
+            <a:r>
+              <a:rPr lang="en-GB" sz="1000">
+                <a:solidFill>
+                  <a:schemeClr val="accent1"/>
+                </a:solidFill>
+              </a:rPr>
+              <a:t>measure</a:t>
+            </a:r>
+          </a:p>
+          <a:p>
+            <a:r>
+              <a:rPr lang="en-GB" sz="1000">
+                <a:solidFill>
+                  <a:schemeClr val="accent1"/>
+                </a:solidFill>
+              </a:rPr>
+              <a:t>measureWithStats</a:t>
+            </a:r>
+          </a:p>
+          <a:p>
+            <a:r>
+              <a:rPr lang="en-GB" sz="1000">
+                <a:solidFill>
+                  <a:schemeClr val="accent1"/>
+                </a:solidFill>
+              </a:rPr>
+              <a:t>multiControlledUnitary</a:t>
+            </a:r>
+          </a:p>
+          <a:p>
+            <a:r>
+              <a:rPr lang="en-GB" sz="1000">
+                <a:solidFill>
+                  <a:schemeClr val="accent1"/>
+                </a:solidFill>
+              </a:rPr>
+              <a:t>reportQuESTEnv</a:t>
+            </a:r>
+          </a:p>
+          <a:p>
+            <a:r>
+              <a:rPr lang="en-GB" sz="1000">
+                <a:solidFill>
+                  <a:schemeClr val="accent1"/>
+                </a:solidFill>
+              </a:rPr>
+              <a:t>sigmaX</a:t>
+            </a:r>
+          </a:p>
+          <a:p>
+            <a:r>
+              <a:rPr lang="en-GB" sz="1000">
+                <a:solidFill>
+                  <a:schemeClr val="accent1"/>
+                </a:solidFill>
+              </a:rPr>
+              <a:t>sigmaY</a:t>
+            </a:r>
+          </a:p>
+          <a:p>
+            <a:r>
+              <a:rPr lang="en-GB" sz="1000">
+                <a:solidFill>
+                  <a:schemeClr val="accent1"/>
+                </a:solidFill>
+              </a:rPr>
+              <a:t>syncQuESTEnv</a:t>
+            </a:r>
+          </a:p>
+          <a:p>
+            <a:r>
+              <a:rPr lang="en-GB" sz="1000">
+                <a:solidFill>
+                  <a:schemeClr val="accent1"/>
+                </a:solidFill>
+              </a:rPr>
+              <a:t>syncQuESTSuccess</a:t>
+            </a:r>
+          </a:p>
+          <a:p>
+            <a:r>
+              <a:rPr lang="en-GB" sz="1000">
+                <a:solidFill>
+                  <a:schemeClr val="accent1"/>
+                </a:solidFill>
+              </a:rPr>
+              <a:t>unitary</a:t>
+            </a:r>
+          </a:p>
+          <a:p>
+            <a:endParaRPr lang="en-GB" sz="1000">
+              <a:solidFill>
+                <a:schemeClr val="accent2"/>
+              </a:solidFill>
+            </a:endParaRPr>
+          </a:p>
+          <a:p>
+            <a:r>
+              <a:rPr lang="en-GB" sz="1000">
+                <a:solidFill>
+                  <a:srgbClr val="7030A0"/>
+                </a:solidFill>
+              </a:rPr>
+              <a:t>reportNodeList</a:t>
+            </a:r>
+            <a:endParaRPr lang="en-GB" sz="1000">
+              <a:solidFill>
+                <a:schemeClr val="accent2"/>
+              </a:solidFill>
+            </a:endParaRPr>
+          </a:p>
+          <a:p>
+            <a:endParaRPr lang="en-US" sz="1000" dirty="0">
+              <a:solidFill>
+                <a:schemeClr val="accent1"/>
+              </a:solidFill>
+            </a:endParaRPr>
+          </a:p>
+        </p:txBody>
+      </p:sp>
+      <p:sp>
+        <p:nvSpPr>
+          <p:cNvPr id="12" name="Rectangle 11">
+            <a:extLst>
+              <a:ext uri="{FF2B5EF4-FFF2-40B4-BE49-F238E27FC236}">
+                <a16:creationId xmlns:a16="http://schemas.microsoft.com/office/drawing/2014/main" id="{ED0F8B5A-F8CB-E14A-80D3-4004BED75494}"/>
+              </a:ext>
+            </a:extLst>
+          </p:cNvPr>
+          <p:cNvSpPr/>
+          <p:nvPr/>
+        </p:nvSpPr>
+        <p:spPr>
+          <a:xfrm>
+            <a:off x="14828962" y="396618"/>
+            <a:ext cx="2310063" cy="6724918"/>
+          </a:xfrm>
+          <a:prstGeom prst="rect">
+            <a:avLst/>
+          </a:prstGeom>
+          <a:ln>
+            <a:solidFill>
+              <a:schemeClr val="tx1"/>
+            </a:solidFill>
+          </a:ln>
+        </p:spPr>
+        <p:txBody>
+          <a:bodyPr wrap="square">
+            <a:spAutoFit/>
+          </a:bodyPr>
+          <a:lstStyle/>
+          <a:p>
+            <a:pPr algn="ctr"/>
+            <a:r>
+              <a:rPr lang="en-GB" sz="1100" b="1">
+                <a:solidFill>
+                  <a:srgbClr val="000000"/>
+                </a:solidFill>
+                <a:latin typeface="Arial" panose="020B0604020202020204" pitchFamily="34" charset="0"/>
+              </a:rPr>
+              <a:t>QuEST_env_mpi.c</a:t>
+            </a:r>
+            <a:endParaRPr lang="en-GB" sz="1000" b="1" dirty="0"/>
+          </a:p>
+          <a:p>
+            <a:br>
+              <a:rPr lang="en-GB" sz="1000"/>
+            </a:br>
+            <a:r>
+              <a:rPr lang="en-GB" sz="1000">
+                <a:solidFill>
+                  <a:schemeClr val="accent1"/>
+                </a:solidFill>
+              </a:rPr>
+              <a:t>calcTotalProbability</a:t>
+            </a:r>
+          </a:p>
+          <a:p>
+            <a:r>
+              <a:rPr lang="en-GB" sz="1000">
+                <a:solidFill>
+                  <a:schemeClr val="accent1"/>
+                </a:solidFill>
+              </a:rPr>
+              <a:t>closeQuESTEnv</a:t>
+            </a:r>
+          </a:p>
+          <a:p>
+            <a:r>
+              <a:rPr lang="en-GB" sz="1000">
+                <a:solidFill>
+                  <a:schemeClr val="accent1"/>
+                </a:solidFill>
+              </a:rPr>
+              <a:t>collapseToOutcome</a:t>
+            </a:r>
+          </a:p>
+          <a:p>
+            <a:r>
+              <a:rPr lang="en-GB" sz="1000">
+                <a:solidFill>
+                  <a:schemeClr val="accent1"/>
+                </a:solidFill>
+              </a:rPr>
+              <a:t>compactUnitary</a:t>
+            </a:r>
+          </a:p>
+          <a:p>
+            <a:r>
+              <a:rPr lang="en-GB" sz="1000">
+                <a:solidFill>
+                  <a:schemeClr val="accent1"/>
+                </a:solidFill>
+              </a:rPr>
+              <a:t>controlledCompactUnitary</a:t>
+            </a:r>
+          </a:p>
+          <a:p>
+            <a:r>
+              <a:rPr lang="en-GB" sz="1000">
+                <a:solidFill>
+                  <a:schemeClr val="accent1"/>
+                </a:solidFill>
+              </a:rPr>
+              <a:t>controlledNot</a:t>
+            </a:r>
+          </a:p>
+          <a:p>
+            <a:r>
+              <a:rPr lang="en-GB" sz="1000">
+                <a:solidFill>
+                  <a:schemeClr val="accent1"/>
+                </a:solidFill>
+              </a:rPr>
+              <a:t>controlledUnitary</a:t>
+            </a:r>
+          </a:p>
+          <a:p>
+            <a:r>
+              <a:rPr lang="en-GB" sz="1000">
+                <a:solidFill>
+                  <a:schemeClr val="accent1"/>
+                </a:solidFill>
+              </a:rPr>
+              <a:t>findProbabilityOfOutcome</a:t>
+            </a:r>
+          </a:p>
+          <a:p>
+            <a:r>
+              <a:rPr lang="en-GB" sz="1000">
+                <a:solidFill>
+                  <a:schemeClr val="accent1"/>
+                </a:solidFill>
+              </a:rPr>
+              <a:t>getImagAmpEl</a:t>
+            </a:r>
+          </a:p>
+          <a:p>
+            <a:r>
+              <a:rPr lang="en-GB" sz="1000">
+                <a:solidFill>
+                  <a:schemeClr val="accent1"/>
+                </a:solidFill>
+              </a:rPr>
+              <a:t>getRealAmpEl</a:t>
+            </a:r>
+            <a:endParaRPr lang="en-GB" sz="1000"/>
+          </a:p>
+          <a:p>
+            <a:r>
+              <a:rPr lang="en-GB" sz="1000">
+                <a:solidFill>
+                  <a:schemeClr val="accent1"/>
+                </a:solidFill>
+              </a:rPr>
+              <a:t>hadamard</a:t>
+            </a:r>
+            <a:endParaRPr lang="en-GB" sz="1000">
+              <a:solidFill>
+                <a:srgbClr val="C00000"/>
+              </a:solidFill>
+            </a:endParaRPr>
+          </a:p>
+          <a:p>
+            <a:r>
+              <a:rPr lang="en-GB" sz="1000">
+                <a:solidFill>
+                  <a:schemeClr val="accent1"/>
+                </a:solidFill>
+              </a:rPr>
+              <a:t>initQuESTEnv</a:t>
+            </a:r>
+          </a:p>
+          <a:p>
+            <a:r>
+              <a:rPr lang="en-GB" sz="1000">
+                <a:solidFill>
+                  <a:schemeClr val="accent1"/>
+                </a:solidFill>
+              </a:rPr>
+              <a:t>measure</a:t>
+            </a:r>
+          </a:p>
+          <a:p>
+            <a:r>
+              <a:rPr lang="en-GB" sz="1000">
+                <a:solidFill>
+                  <a:schemeClr val="accent1"/>
+                </a:solidFill>
+              </a:rPr>
+              <a:t>measureWithStats</a:t>
+            </a:r>
+          </a:p>
+          <a:p>
+            <a:r>
+              <a:rPr lang="en-GB" sz="1000">
+                <a:solidFill>
+                  <a:schemeClr val="accent1"/>
+                </a:solidFill>
+              </a:rPr>
+              <a:t>multiControlledUnitary</a:t>
+            </a:r>
+            <a:endParaRPr lang="en-GB" sz="1000">
+              <a:solidFill>
+                <a:srgbClr val="7030A0"/>
+              </a:solidFill>
+            </a:endParaRPr>
+          </a:p>
+          <a:p>
+            <a:r>
+              <a:rPr lang="en-GB" sz="1000">
+                <a:solidFill>
+                  <a:schemeClr val="accent1"/>
+                </a:solidFill>
+              </a:rPr>
+              <a:t>reportQuESTEnv</a:t>
+            </a:r>
+          </a:p>
+          <a:p>
+            <a:r>
+              <a:rPr lang="en-GB" sz="1000">
+                <a:solidFill>
+                  <a:schemeClr val="accent1"/>
+                </a:solidFill>
+              </a:rPr>
+              <a:t>sigmaX</a:t>
+            </a:r>
+          </a:p>
+          <a:p>
+            <a:r>
+              <a:rPr lang="en-GB" sz="1000">
+                <a:solidFill>
+                  <a:schemeClr val="accent1"/>
+                </a:solidFill>
+              </a:rPr>
+              <a:t>sigmaY</a:t>
+            </a:r>
+          </a:p>
+          <a:p>
+            <a:r>
+              <a:rPr lang="en-GB" sz="1000">
+                <a:solidFill>
+                  <a:schemeClr val="accent1"/>
+                </a:solidFill>
+              </a:rPr>
+              <a:t>syncQuESTEnv</a:t>
+            </a:r>
+          </a:p>
+          <a:p>
+            <a:r>
+              <a:rPr lang="en-GB" sz="1000">
+                <a:solidFill>
+                  <a:schemeClr val="accent1"/>
+                </a:solidFill>
+              </a:rPr>
+              <a:t>syncQuESTSuccess</a:t>
+            </a:r>
+          </a:p>
+          <a:p>
+            <a:r>
+              <a:rPr lang="en-GB" sz="1000">
+                <a:solidFill>
+                  <a:schemeClr val="accent1"/>
+                </a:solidFill>
+              </a:rPr>
+              <a:t>unitary</a:t>
+            </a:r>
+          </a:p>
+          <a:p>
+            <a:endParaRPr lang="en-GB" sz="1000">
+              <a:solidFill>
+                <a:schemeClr val="accent1"/>
+              </a:solidFill>
+            </a:endParaRPr>
+          </a:p>
+          <a:p>
+            <a:r>
+              <a:rPr lang="en-GB" sz="1000">
+                <a:solidFill>
+                  <a:srgbClr val="7030A0"/>
+                </a:solidFill>
+              </a:rPr>
+              <a:t>reportNodeList</a:t>
+            </a:r>
+          </a:p>
+          <a:p>
+            <a:endParaRPr lang="en-GB" sz="1000">
+              <a:solidFill>
+                <a:schemeClr val="accent1"/>
+              </a:solidFill>
+            </a:endParaRPr>
+          </a:p>
+          <a:p>
+            <a:r>
+              <a:rPr lang="en-GB" sz="1000">
+                <a:solidFill>
+                  <a:srgbClr val="C00000"/>
+                </a:solidFill>
+              </a:rPr>
+              <a:t>chunkIsUpper</a:t>
+            </a:r>
+          </a:p>
+          <a:p>
+            <a:r>
+              <a:rPr lang="en-GB" sz="1000">
+                <a:solidFill>
+                  <a:srgbClr val="C00000"/>
+                </a:solidFill>
+              </a:rPr>
+              <a:t>getChunkIdFromIndex</a:t>
+            </a:r>
+          </a:p>
+          <a:p>
+            <a:r>
+              <a:rPr lang="en-GB" sz="1000">
+                <a:solidFill>
+                  <a:srgbClr val="C00000"/>
+                </a:solidFill>
+              </a:rPr>
+              <a:t>getChunkPairId</a:t>
+            </a:r>
+          </a:p>
+          <a:p>
+            <a:r>
+              <a:rPr lang="en-GB" sz="1000">
+                <a:solidFill>
+                  <a:srgbClr val="C00000"/>
+                </a:solidFill>
+              </a:rPr>
+              <a:t>getRotAngle</a:t>
+            </a:r>
+          </a:p>
+          <a:p>
+            <a:r>
+              <a:rPr lang="en-GB" sz="1000">
+                <a:solidFill>
+                  <a:srgbClr val="C00000"/>
+                </a:solidFill>
+              </a:rPr>
+              <a:t>halfMatrixBlockFitsInChunk</a:t>
+            </a:r>
+            <a:endParaRPr lang="en-GB" sz="1000">
+              <a:solidFill>
+                <a:schemeClr val="accent1"/>
+              </a:solidFill>
+            </a:endParaRPr>
+          </a:p>
+          <a:p>
+            <a:r>
+              <a:rPr lang="en-GB" sz="1000">
+                <a:solidFill>
+                  <a:srgbClr val="C00000"/>
+                </a:solidFill>
+              </a:rPr>
+              <a:t>isChunkToSkipInFindPZero</a:t>
+            </a:r>
+          </a:p>
+          <a:p>
+            <a:endParaRPr lang="en-GB" sz="1000">
+              <a:solidFill>
+                <a:srgbClr val="C00000"/>
+              </a:solidFill>
+            </a:endParaRPr>
+          </a:p>
+          <a:p>
+            <a:r>
+              <a:rPr lang="en-GB" sz="1000"/>
+              <a:t>exchangeStateVectors</a:t>
+            </a:r>
+          </a:p>
+          <a:p>
+            <a:r>
+              <a:rPr lang="en-GB" sz="1000"/>
+              <a:t>getRotAngleFromUnitaryMatrix</a:t>
+            </a:r>
+            <a:endParaRPr lang="en-GB" sz="1000">
+              <a:solidFill>
+                <a:srgbClr val="C00000"/>
+              </a:solidFill>
+            </a:endParaRPr>
+          </a:p>
+          <a:p>
+            <a:endParaRPr lang="en-GB" sz="1000">
+              <a:solidFill>
+                <a:schemeClr val="accent1"/>
+              </a:solidFill>
+            </a:endParaRPr>
+          </a:p>
+          <a:p>
+            <a:pPr algn="ctr"/>
+            <a:r>
+              <a:rPr lang="en-GB" sz="1000" b="1"/>
+              <a:t>Prototyped:</a:t>
+            </a:r>
+          </a:p>
+          <a:p>
+            <a:r>
+              <a:rPr lang="en-GB" sz="1000">
+                <a:solidFill>
+                  <a:srgbClr val="C00000"/>
+                </a:solidFill>
+              </a:rPr>
+              <a:t>chunkIsUpper</a:t>
+            </a:r>
+          </a:p>
+          <a:p>
+            <a:r>
+              <a:rPr lang="en-GB" sz="1000">
+                <a:solidFill>
+                  <a:srgbClr val="C00000"/>
+                </a:solidFill>
+              </a:rPr>
+              <a:t>getChunkIdFromIndex</a:t>
+            </a:r>
+          </a:p>
+          <a:p>
+            <a:r>
+              <a:rPr lang="en-GB" sz="1000">
+                <a:solidFill>
+                  <a:srgbClr val="C00000"/>
+                </a:solidFill>
+              </a:rPr>
+              <a:t>getChunkPairId</a:t>
+            </a:r>
+          </a:p>
+          <a:p>
+            <a:r>
+              <a:rPr lang="en-GB" sz="1000">
+                <a:solidFill>
+                  <a:srgbClr val="C00000"/>
+                </a:solidFill>
+              </a:rPr>
+              <a:t>getRotAngle</a:t>
+            </a:r>
+          </a:p>
+          <a:p>
+            <a:r>
+              <a:rPr lang="en-GB" sz="1000">
+                <a:solidFill>
+                  <a:srgbClr val="C00000"/>
+                </a:solidFill>
+              </a:rPr>
+              <a:t>halfMatrixBlockFitsInChunk</a:t>
+            </a:r>
+          </a:p>
+          <a:p>
+            <a:r>
+              <a:rPr lang="en-GB" sz="1000">
+                <a:solidFill>
+                  <a:srgbClr val="C00000"/>
+                </a:solidFill>
+              </a:rPr>
+              <a:t>isChunkToSkipInFindPZero</a:t>
+            </a:r>
+          </a:p>
+        </p:txBody>
+      </p:sp>
+      <p:sp>
+        <p:nvSpPr>
+          <p:cNvPr id="13" name="TextBox 12">
+            <a:extLst>
+              <a:ext uri="{FF2B5EF4-FFF2-40B4-BE49-F238E27FC236}">
+                <a16:creationId xmlns:a16="http://schemas.microsoft.com/office/drawing/2014/main" id="{BD8902AA-B565-E74E-95E7-AF55E11460FB}"/>
+              </a:ext>
+            </a:extLst>
+          </p:cNvPr>
+          <p:cNvSpPr txBox="1"/>
+          <p:nvPr/>
+        </p:nvSpPr>
+        <p:spPr>
+          <a:xfrm>
+            <a:off x="1037130" y="19581"/>
+            <a:ext cx="669380" cy="369332"/>
+          </a:xfrm>
+          <a:prstGeom prst="rect">
+            <a:avLst/>
+          </a:prstGeom>
+          <a:noFill/>
+        </p:spPr>
+        <p:txBody>
+          <a:bodyPr wrap="square" rtlCol="0">
+            <a:spAutoFit/>
+          </a:bodyPr>
+          <a:lstStyle/>
+          <a:p>
+            <a:r>
+              <a:rPr lang="en-US" b="1"/>
+              <a:t>GPU</a:t>
+            </a:r>
+          </a:p>
+        </p:txBody>
+      </p:sp>
+      <p:sp>
+        <p:nvSpPr>
+          <p:cNvPr id="14" name="TextBox 13">
+            <a:extLst>
+              <a:ext uri="{FF2B5EF4-FFF2-40B4-BE49-F238E27FC236}">
+                <a16:creationId xmlns:a16="http://schemas.microsoft.com/office/drawing/2014/main" id="{B8F36A11-7920-CD4B-909D-2BAAD40F49FD}"/>
+              </a:ext>
+            </a:extLst>
+          </p:cNvPr>
+          <p:cNvSpPr txBox="1"/>
+          <p:nvPr/>
+        </p:nvSpPr>
+        <p:spPr>
+          <a:xfrm>
+            <a:off x="14164576" y="19581"/>
+            <a:ext cx="1794294" cy="369332"/>
+          </a:xfrm>
+          <a:prstGeom prst="rect">
+            <a:avLst/>
+          </a:prstGeom>
+          <a:noFill/>
+        </p:spPr>
+        <p:txBody>
+          <a:bodyPr wrap="square" rtlCol="0">
+            <a:spAutoFit/>
+          </a:bodyPr>
+          <a:lstStyle/>
+          <a:p>
+            <a:r>
+              <a:rPr lang="en-US" b="1"/>
+              <a:t>CPU &amp; MPI</a:t>
+            </a:r>
+          </a:p>
+        </p:txBody>
+      </p:sp>
+      <p:sp>
+        <p:nvSpPr>
+          <p:cNvPr id="15" name="Rectangle 14">
+            <a:extLst>
+              <a:ext uri="{FF2B5EF4-FFF2-40B4-BE49-F238E27FC236}">
+                <a16:creationId xmlns:a16="http://schemas.microsoft.com/office/drawing/2014/main" id="{805A3A87-15BE-9147-A24F-7E525A805080}"/>
+              </a:ext>
+            </a:extLst>
+          </p:cNvPr>
+          <p:cNvSpPr/>
+          <p:nvPr/>
+        </p:nvSpPr>
+        <p:spPr>
+          <a:xfrm>
+            <a:off x="7131106" y="8290758"/>
+            <a:ext cx="1802757" cy="1184940"/>
+          </a:xfrm>
+          <a:prstGeom prst="rect">
+            <a:avLst/>
+          </a:prstGeom>
+          <a:ln w="38100">
+            <a:solidFill>
+              <a:srgbClr val="7030A0"/>
+            </a:solidFill>
+          </a:ln>
+        </p:spPr>
+        <p:txBody>
+          <a:bodyPr wrap="square">
+            <a:spAutoFit/>
+          </a:bodyPr>
+          <a:lstStyle/>
+          <a:p>
+            <a:pPr algn="ctr"/>
+            <a:r>
+              <a:rPr lang="en-GB" sz="1100" b="1">
+                <a:solidFill>
+                  <a:srgbClr val="000000"/>
+                </a:solidFill>
+                <a:latin typeface="Arial" panose="020B0604020202020204" pitchFamily="34" charset="0"/>
+              </a:rPr>
+              <a:t>QuEST_debug.h</a:t>
+            </a:r>
+            <a:endParaRPr lang="en-GB" sz="1000" b="1" dirty="0"/>
+          </a:p>
+          <a:p>
+            <a:br>
+              <a:rPr lang="en-GB" sz="1000"/>
+            </a:br>
+            <a:r>
+              <a:rPr lang="en-GB" sz="1000">
+                <a:solidFill>
+                  <a:srgbClr val="7030A0"/>
+                </a:solidFill>
+              </a:rPr>
+              <a:t>compareStates</a:t>
+            </a:r>
+          </a:p>
+          <a:p>
+            <a:r>
+              <a:rPr lang="en-GB" sz="1000">
+                <a:solidFill>
+                  <a:srgbClr val="7030A0"/>
+                </a:solidFill>
+              </a:rPr>
+              <a:t>initStateDebug</a:t>
+            </a:r>
+          </a:p>
+          <a:p>
+            <a:r>
+              <a:rPr lang="en-GB" sz="1000">
+                <a:solidFill>
+                  <a:srgbClr val="7030A0"/>
+                </a:solidFill>
+              </a:rPr>
+              <a:t>initStateOfSingleQubit</a:t>
+            </a:r>
+          </a:p>
+          <a:p>
+            <a:r>
+              <a:rPr lang="en-GB" sz="1000">
+                <a:solidFill>
+                  <a:srgbClr val="7030A0"/>
+                </a:solidFill>
+              </a:rPr>
+              <a:t>initializeStateFromSingleFile</a:t>
+            </a:r>
+          </a:p>
+          <a:p>
+            <a:r>
+              <a:rPr lang="en-GB" sz="1000">
+                <a:solidFill>
+                  <a:srgbClr val="7030A0"/>
+                </a:solidFill>
+              </a:rPr>
+              <a:t>reportNodeList</a:t>
+            </a:r>
+            <a:endParaRPr lang="en-GB" sz="1000" dirty="0">
+              <a:solidFill>
+                <a:srgbClr val="7030A0"/>
+              </a:solidFill>
+            </a:endParaRPr>
+          </a:p>
+        </p:txBody>
+      </p:sp>
+      <p:sp>
+        <p:nvSpPr>
+          <p:cNvPr id="16" name="TextBox 15">
+            <a:extLst>
+              <a:ext uri="{FF2B5EF4-FFF2-40B4-BE49-F238E27FC236}">
+                <a16:creationId xmlns:a16="http://schemas.microsoft.com/office/drawing/2014/main" id="{BDE6D690-D7BC-1548-971F-226BA0E12BD9}"/>
+              </a:ext>
+            </a:extLst>
+          </p:cNvPr>
+          <p:cNvSpPr txBox="1"/>
+          <p:nvPr/>
+        </p:nvSpPr>
+        <p:spPr>
+          <a:xfrm>
+            <a:off x="7781025" y="-549"/>
+            <a:ext cx="789229" cy="369332"/>
+          </a:xfrm>
+          <a:prstGeom prst="rect">
+            <a:avLst/>
+          </a:prstGeom>
+          <a:noFill/>
+        </p:spPr>
+        <p:txBody>
+          <a:bodyPr wrap="square" rtlCol="0">
+            <a:spAutoFit/>
+          </a:bodyPr>
+          <a:lstStyle/>
+          <a:p>
+            <a:r>
+              <a:rPr lang="en-US" b="1"/>
+              <a:t>API</a:t>
+            </a:r>
+          </a:p>
+        </p:txBody>
+      </p:sp>
+      <p:sp>
+        <p:nvSpPr>
+          <p:cNvPr id="18" name="Rectangle 17">
+            <a:extLst>
+              <a:ext uri="{FF2B5EF4-FFF2-40B4-BE49-F238E27FC236}">
+                <a16:creationId xmlns:a16="http://schemas.microsoft.com/office/drawing/2014/main" id="{08AA78B8-B2E1-0946-B221-12AD35A331BB}"/>
+              </a:ext>
+            </a:extLst>
+          </p:cNvPr>
+          <p:cNvSpPr/>
+          <p:nvPr/>
+        </p:nvSpPr>
+        <p:spPr>
+          <a:xfrm>
+            <a:off x="4260148" y="412659"/>
+            <a:ext cx="1886602" cy="1492716"/>
+          </a:xfrm>
+          <a:prstGeom prst="rect">
+            <a:avLst/>
+          </a:prstGeom>
+          <a:ln>
+            <a:solidFill>
+              <a:schemeClr val="tx1"/>
+            </a:solidFill>
+          </a:ln>
+        </p:spPr>
+        <p:txBody>
+          <a:bodyPr wrap="square">
+            <a:spAutoFit/>
+          </a:bodyPr>
+          <a:lstStyle/>
+          <a:p>
+            <a:pPr algn="ctr"/>
+            <a:r>
+              <a:rPr lang="en-GB" sz="1100" b="1">
+                <a:solidFill>
+                  <a:srgbClr val="000000"/>
+                </a:solidFill>
+                <a:latin typeface="Arial" panose="020B0604020202020204" pitchFamily="34" charset="0"/>
+              </a:rPr>
+              <a:t>QuEST_newinternal.h</a:t>
+            </a:r>
+            <a:endParaRPr lang="en-GB" sz="1000" b="1" dirty="0"/>
+          </a:p>
+          <a:p>
+            <a:br>
+              <a:rPr lang="en-GB" sz="1000"/>
+            </a:br>
+            <a:r>
+              <a:rPr lang="en-GB" sz="1000"/>
+              <a:t>QuESTAssert</a:t>
+            </a:r>
+          </a:p>
+          <a:p>
+            <a:r>
+              <a:rPr lang="en-GB" sz="1000"/>
+              <a:t>exitWithError</a:t>
+            </a:r>
+          </a:p>
+          <a:p>
+            <a:r>
+              <a:rPr lang="en-GB" sz="1000"/>
+              <a:t>hashString</a:t>
+            </a:r>
+          </a:p>
+          <a:p>
+            <a:r>
+              <a:rPr lang="en-GB" sz="1000"/>
+              <a:t>phaseGate</a:t>
+            </a:r>
+          </a:p>
+          <a:p>
+            <a:r>
+              <a:rPr lang="en-GB" sz="1000"/>
+              <a:t>validateAlphaBeta</a:t>
+            </a:r>
+          </a:p>
+          <a:p>
+            <a:r>
+              <a:rPr lang="en-GB" sz="1000"/>
+              <a:t>validateMatrixIsUnitary</a:t>
+            </a:r>
+          </a:p>
+          <a:p>
+            <a:r>
+              <a:rPr lang="en-GB" sz="1000"/>
+              <a:t>validadateUnitVector</a:t>
+            </a:r>
+          </a:p>
+        </p:txBody>
+      </p:sp>
+      <p:sp>
+        <p:nvSpPr>
+          <p:cNvPr id="19" name="TextBox 18">
+            <a:extLst>
+              <a:ext uri="{FF2B5EF4-FFF2-40B4-BE49-F238E27FC236}">
+                <a16:creationId xmlns:a16="http://schemas.microsoft.com/office/drawing/2014/main" id="{3102159B-9B71-894A-8217-692ACBFA49F2}"/>
+              </a:ext>
+            </a:extLst>
+          </p:cNvPr>
+          <p:cNvSpPr txBox="1"/>
+          <p:nvPr/>
+        </p:nvSpPr>
+        <p:spPr>
+          <a:xfrm>
+            <a:off x="4649900" y="-9638"/>
+            <a:ext cx="1427875" cy="369332"/>
+          </a:xfrm>
+          <a:prstGeom prst="rect">
+            <a:avLst/>
+          </a:prstGeom>
+          <a:noFill/>
+        </p:spPr>
+        <p:txBody>
+          <a:bodyPr wrap="square" rtlCol="0">
+            <a:spAutoFit/>
+          </a:bodyPr>
+          <a:lstStyle/>
+          <a:p>
+            <a:r>
+              <a:rPr lang="en-US" b="1"/>
+              <a:t>common</a:t>
+            </a:r>
+          </a:p>
+        </p:txBody>
+      </p:sp>
+      <p:sp>
+        <p:nvSpPr>
+          <p:cNvPr id="20" name="Rectangle 19">
+            <a:extLst>
+              <a:ext uri="{FF2B5EF4-FFF2-40B4-BE49-F238E27FC236}">
+                <a16:creationId xmlns:a16="http://schemas.microsoft.com/office/drawing/2014/main" id="{CE5691B5-18DB-414B-AFDD-C09F8DA5B477}"/>
+              </a:ext>
+            </a:extLst>
+          </p:cNvPr>
+          <p:cNvSpPr/>
+          <p:nvPr/>
+        </p:nvSpPr>
+        <p:spPr>
+          <a:xfrm>
+            <a:off x="4255954" y="2028486"/>
+            <a:ext cx="1886602" cy="4108817"/>
+          </a:xfrm>
+          <a:prstGeom prst="rect">
+            <a:avLst/>
+          </a:prstGeom>
+          <a:ln>
+            <a:solidFill>
+              <a:schemeClr val="tx1"/>
+            </a:solidFill>
+          </a:ln>
+        </p:spPr>
+        <p:txBody>
+          <a:bodyPr wrap="square">
+            <a:spAutoFit/>
+          </a:bodyPr>
+          <a:lstStyle/>
+          <a:p>
+            <a:pPr algn="ctr"/>
+            <a:r>
+              <a:rPr lang="en-GB" sz="1100" b="1">
+                <a:solidFill>
+                  <a:srgbClr val="000000"/>
+                </a:solidFill>
+                <a:latin typeface="Arial" panose="020B0604020202020204" pitchFamily="34" charset="0"/>
+              </a:rPr>
+              <a:t>QuEST_common.c</a:t>
+            </a:r>
+            <a:endParaRPr lang="en-GB" sz="1000" b="1" dirty="0"/>
+          </a:p>
+          <a:p>
+            <a:br>
+              <a:rPr lang="en-GB" sz="1000"/>
+            </a:br>
+            <a:r>
+              <a:rPr lang="en-GB" sz="1000"/>
+              <a:t>QuESTAssert</a:t>
+            </a:r>
+          </a:p>
+          <a:p>
+            <a:r>
+              <a:rPr lang="en-GB" sz="1000"/>
+              <a:t>controlledRotateAroundAxis</a:t>
+            </a:r>
+          </a:p>
+          <a:p>
+            <a:r>
+              <a:rPr lang="en-GB" sz="1000"/>
+              <a:t>controlledRotateX</a:t>
+            </a:r>
+          </a:p>
+          <a:p>
+            <a:r>
+              <a:rPr lang="en-GB" sz="1000"/>
+              <a:t>controlledRotateY</a:t>
+            </a:r>
+          </a:p>
+          <a:p>
+            <a:r>
+              <a:rPr lang="en-GB" sz="1000"/>
+              <a:t>controlledRotateZ</a:t>
+            </a:r>
+          </a:p>
+          <a:p>
+            <a:r>
+              <a:rPr lang="en-GB" sz="1000"/>
+              <a:t>exitWithError</a:t>
+            </a:r>
+          </a:p>
+          <a:p>
+            <a:r>
+              <a:rPr lang="en-GB" sz="1000"/>
+              <a:t>getNumAmps</a:t>
+            </a:r>
+          </a:p>
+          <a:p>
+            <a:r>
+              <a:rPr lang="en-GB" sz="1000"/>
+              <a:t>getNumQubits</a:t>
+            </a:r>
+          </a:p>
+          <a:p>
+            <a:r>
+              <a:rPr lang="en-GB" sz="1000"/>
+              <a:t>getProbEl</a:t>
+            </a:r>
+          </a:p>
+          <a:p>
+            <a:r>
+              <a:rPr lang="en-GB" sz="1000"/>
+              <a:t>hashString</a:t>
+            </a:r>
+          </a:p>
+          <a:p>
+            <a:r>
+              <a:rPr lang="en-GB" sz="1000"/>
+              <a:t>reportMultiQubitParams</a:t>
+            </a:r>
+          </a:p>
+          <a:p>
+            <a:r>
+              <a:rPr lang="en-GB" sz="1000"/>
+              <a:t>reportState</a:t>
+            </a:r>
+          </a:p>
+          <a:p>
+            <a:r>
+              <a:rPr lang="en-GB" sz="1000"/>
+              <a:t>rotateAroundAxis</a:t>
+            </a:r>
+          </a:p>
+          <a:p>
+            <a:r>
+              <a:rPr lang="en-GB" sz="1000"/>
+              <a:t>rotateX</a:t>
+            </a:r>
+          </a:p>
+          <a:p>
+            <a:r>
+              <a:rPr lang="en-GB" sz="1000"/>
+              <a:t>rotateY</a:t>
+            </a:r>
+          </a:p>
+          <a:p>
+            <a:r>
+              <a:rPr lang="en-GB" sz="1000"/>
+              <a:t>rotateZ</a:t>
+            </a:r>
+          </a:p>
+          <a:p>
+            <a:r>
+              <a:rPr lang="en-GB" sz="1000"/>
+              <a:t>sGate</a:t>
+            </a:r>
+          </a:p>
+          <a:p>
+            <a:r>
+              <a:rPr lang="en-GB" sz="1000"/>
+              <a:t>seedQuEST</a:t>
+            </a:r>
+          </a:p>
+          <a:p>
+            <a:r>
+              <a:rPr lang="en-GB" sz="1000"/>
+              <a:t>seedQuESTDefault</a:t>
+            </a:r>
+          </a:p>
+          <a:p>
+            <a:r>
+              <a:rPr lang="en-GB" sz="1000"/>
+              <a:t>sigmaZ</a:t>
+            </a:r>
+          </a:p>
+          <a:p>
+            <a:r>
+              <a:rPr lang="en-GB" sz="1000"/>
+              <a:t>tGate</a:t>
+            </a:r>
+          </a:p>
+          <a:p>
+            <a:r>
+              <a:rPr lang="en-GB" sz="1000"/>
+              <a:t>validateAlphaBeta</a:t>
+            </a:r>
+          </a:p>
+          <a:p>
+            <a:r>
+              <a:rPr lang="en-GB" sz="1000"/>
+              <a:t>validateMatrixIsUnitary</a:t>
+            </a:r>
+          </a:p>
+          <a:p>
+            <a:r>
+              <a:rPr lang="en-GB" sz="1000"/>
+              <a:t>validateUnitVector</a:t>
+            </a:r>
+          </a:p>
+        </p:txBody>
+      </p:sp>
+      <p:sp>
+        <p:nvSpPr>
+          <p:cNvPr id="2" name="TextBox 1">
+            <a:extLst>
+              <a:ext uri="{FF2B5EF4-FFF2-40B4-BE49-F238E27FC236}">
+                <a16:creationId xmlns:a16="http://schemas.microsoft.com/office/drawing/2014/main" id="{6DC87922-DCF4-0044-B59E-16C4EE30D648}"/>
+              </a:ext>
+            </a:extLst>
+          </p:cNvPr>
+          <p:cNvSpPr txBox="1"/>
+          <p:nvPr/>
+        </p:nvSpPr>
+        <p:spPr>
+          <a:xfrm>
+            <a:off x="10478412" y="8598535"/>
+            <a:ext cx="6239205" cy="923330"/>
+          </a:xfrm>
+          <a:prstGeom prst="rect">
+            <a:avLst/>
+          </a:prstGeom>
+          <a:noFill/>
+        </p:spPr>
+        <p:txBody>
+          <a:bodyPr wrap="square" rtlCol="0">
+            <a:spAutoFit/>
+          </a:bodyPr>
+          <a:lstStyle/>
+          <a:p>
+            <a:r>
+              <a:rPr lang="en-US" sz="5400" b="1">
+                <a:solidFill>
+                  <a:srgbClr val="FF0000"/>
+                </a:solidFill>
+              </a:rPr>
+              <a:t>NOT UP TO DATE!!</a:t>
+            </a:r>
+          </a:p>
+        </p:txBody>
+      </p:sp>
+    </p:spTree>
+    <p:extLst>
+      <p:ext uri="{BB962C8B-B14F-4D97-AF65-F5344CB8AC3E}">
+        <p14:creationId xmlns:p14="http://schemas.microsoft.com/office/powerpoint/2010/main" val="3470185741"/>
       </p:ext>
     </p:extLst>
   </p:cSld>

</xml_diff>